<commit_message>
Add package to demonstrate SSIS Package parameters.
</commit_message>
<xml_diff>
--- a/SSIS_DEPLOYMENT_AND_SQL_AGENT/SSIS_DEPLOYMENT_AND_SQL_AGENT_SCREEN_SHOTS.pptx
+++ b/SSIS_DEPLOYMENT_AND_SQL_AGENT/SSIS_DEPLOYMENT_AND_SQL_AGENT_SCREEN_SHOTS.pptx
@@ -6,32 +6,41 @@
   </p:sldMasterIdLst>
   <p:sldIdLst>
     <p:sldId id="256" r:id="rId2"/>
-    <p:sldId id="257" r:id="rId3"/>
-    <p:sldId id="258" r:id="rId4"/>
-    <p:sldId id="259" r:id="rId5"/>
-    <p:sldId id="261" r:id="rId6"/>
-    <p:sldId id="262" r:id="rId7"/>
-    <p:sldId id="263" r:id="rId8"/>
-    <p:sldId id="264" r:id="rId9"/>
-    <p:sldId id="265" r:id="rId10"/>
-    <p:sldId id="266" r:id="rId11"/>
-    <p:sldId id="267" r:id="rId12"/>
-    <p:sldId id="268" r:id="rId13"/>
-    <p:sldId id="269" r:id="rId14"/>
-    <p:sldId id="270" r:id="rId15"/>
-    <p:sldId id="271" r:id="rId16"/>
-    <p:sldId id="272" r:id="rId17"/>
-    <p:sldId id="273" r:id="rId18"/>
-    <p:sldId id="274" r:id="rId19"/>
-    <p:sldId id="275" r:id="rId20"/>
-    <p:sldId id="276" r:id="rId21"/>
-    <p:sldId id="277" r:id="rId22"/>
-    <p:sldId id="278" r:id="rId23"/>
-    <p:sldId id="279" r:id="rId24"/>
-    <p:sldId id="280" r:id="rId25"/>
-    <p:sldId id="281" r:id="rId26"/>
-    <p:sldId id="282" r:id="rId27"/>
-    <p:sldId id="284" r:id="rId28"/>
+    <p:sldId id="285" r:id="rId3"/>
+    <p:sldId id="286" r:id="rId4"/>
+    <p:sldId id="287" r:id="rId5"/>
+    <p:sldId id="292" r:id="rId6"/>
+    <p:sldId id="291" r:id="rId7"/>
+    <p:sldId id="290" r:id="rId8"/>
+    <p:sldId id="293" r:id="rId9"/>
+    <p:sldId id="288" r:id="rId10"/>
+    <p:sldId id="289" r:id="rId11"/>
+    <p:sldId id="257" r:id="rId12"/>
+    <p:sldId id="258" r:id="rId13"/>
+    <p:sldId id="259" r:id="rId14"/>
+    <p:sldId id="261" r:id="rId15"/>
+    <p:sldId id="262" r:id="rId16"/>
+    <p:sldId id="263" r:id="rId17"/>
+    <p:sldId id="264" r:id="rId18"/>
+    <p:sldId id="265" r:id="rId19"/>
+    <p:sldId id="266" r:id="rId20"/>
+    <p:sldId id="267" r:id="rId21"/>
+    <p:sldId id="268" r:id="rId22"/>
+    <p:sldId id="269" r:id="rId23"/>
+    <p:sldId id="270" r:id="rId24"/>
+    <p:sldId id="271" r:id="rId25"/>
+    <p:sldId id="272" r:id="rId26"/>
+    <p:sldId id="273" r:id="rId27"/>
+    <p:sldId id="274" r:id="rId28"/>
+    <p:sldId id="275" r:id="rId29"/>
+    <p:sldId id="276" r:id="rId30"/>
+    <p:sldId id="277" r:id="rId31"/>
+    <p:sldId id="278" r:id="rId32"/>
+    <p:sldId id="279" r:id="rId33"/>
+    <p:sldId id="280" r:id="rId34"/>
+    <p:sldId id="281" r:id="rId35"/>
+    <p:sldId id="282" r:id="rId36"/>
+    <p:sldId id="284" r:id="rId37"/>
   </p:sldIdLst>
   <p:sldSz cx="12192000" cy="6858000"/>
   <p:notesSz cx="6858000" cy="9144000"/>
@@ -3375,7 +3384,7 @@
           <a:p>
             <a:r>
               <a:rPr lang="en-US" dirty="0"/>
-              <a:t>SSIS Project Parameters</a:t>
+              <a:t>SSIS Deployment and SQL Agent</a:t>
             </a:r>
           </a:p>
         </p:txBody>
@@ -3422,6 +3431,1358 @@
 </file>
 
 <file path=ppt/slides/slide10.xml><?xml version="1.0" encoding="utf-8"?>
+<p:sld xmlns:a="http://schemas.openxmlformats.org/drawingml/2006/main" xmlns:r="http://schemas.openxmlformats.org/officeDocument/2006/relationships" xmlns:p="http://schemas.openxmlformats.org/presentationml/2006/main">
+  <p:cSld>
+    <p:spTree>
+      <p:nvGrpSpPr>
+        <p:cNvPr id="1" name=""/>
+        <p:cNvGrpSpPr/>
+        <p:nvPr/>
+      </p:nvGrpSpPr>
+      <p:grpSpPr>
+        <a:xfrm>
+          <a:off x="0" y="0"/>
+          <a:ext cx="0" cy="0"/>
+          <a:chOff x="0" y="0"/>
+          <a:chExt cx="0" cy="0"/>
+        </a:xfrm>
+      </p:grpSpPr>
+      <p:sp>
+        <p:nvSpPr>
+          <p:cNvPr id="2" name="Title 1">
+            <a:extLst>
+              <a:ext uri="{FF2B5EF4-FFF2-40B4-BE49-F238E27FC236}">
+                <a16:creationId xmlns:a16="http://schemas.microsoft.com/office/drawing/2014/main" id="{F1242C7A-4C19-4CE4-9AF8-3EB193081576}"/>
+              </a:ext>
+            </a:extLst>
+          </p:cNvPr>
+          <p:cNvSpPr>
+            <a:spLocks noGrp="1"/>
+          </p:cNvSpPr>
+          <p:nvPr>
+            <p:ph type="title"/>
+          </p:nvPr>
+        </p:nvSpPr>
+        <p:spPr/>
+        <p:txBody>
+          <a:bodyPr/>
+          <a:lstStyle/>
+          <a:p>
+            <a:r>
+              <a:rPr lang="en-US" dirty="0"/>
+              <a:t>SSIS Project Parameters</a:t>
+            </a:r>
+          </a:p>
+        </p:txBody>
+      </p:sp>
+      <p:sp>
+        <p:nvSpPr>
+          <p:cNvPr id="3" name="Content Placeholder 2">
+            <a:extLst>
+              <a:ext uri="{FF2B5EF4-FFF2-40B4-BE49-F238E27FC236}">
+                <a16:creationId xmlns:a16="http://schemas.microsoft.com/office/drawing/2014/main" id="{2F46D28C-D3BA-41E9-A701-04E3CC75A5CE}"/>
+              </a:ext>
+            </a:extLst>
+          </p:cNvPr>
+          <p:cNvSpPr>
+            <a:spLocks noGrp="1"/>
+          </p:cNvSpPr>
+          <p:nvPr>
+            <p:ph idx="1"/>
+          </p:nvPr>
+        </p:nvSpPr>
+        <p:spPr/>
+        <p:txBody>
+          <a:bodyPr/>
+          <a:lstStyle/>
+          <a:p>
+            <a:r>
+              <a:rPr lang="en-US" dirty="0"/>
+              <a:t>Example: </a:t>
+            </a:r>
+            <a:r>
+              <a:rPr lang="en-US" dirty="0" err="1"/>
+              <a:t>ServerName</a:t>
+            </a:r>
+            <a:r>
+              <a:rPr lang="en-US" dirty="0"/>
+              <a:t> is OLE DB Connection Manager</a:t>
+            </a:r>
+          </a:p>
+          <a:p>
+            <a:r>
+              <a:rPr lang="en-US" dirty="0"/>
+              <a:t>Need to specify a different </a:t>
+            </a:r>
+            <a:r>
+              <a:rPr lang="en-US" dirty="0" err="1"/>
+              <a:t>ServerName</a:t>
+            </a:r>
+            <a:r>
+              <a:rPr lang="en-US" dirty="0"/>
+              <a:t> value for the connection manager in each stage:  development, QA and PROD</a:t>
+            </a:r>
+          </a:p>
+        </p:txBody>
+      </p:sp>
+    </p:spTree>
+    <p:extLst>
+      <p:ext uri="{BB962C8B-B14F-4D97-AF65-F5344CB8AC3E}">
+        <p14:creationId xmlns:p14="http://schemas.microsoft.com/office/powerpoint/2010/main" val="3328204609"/>
+      </p:ext>
+    </p:extLst>
+  </p:cSld>
+  <p:clrMapOvr>
+    <a:masterClrMapping/>
+  </p:clrMapOvr>
+</p:sld>
+</file>
+
+<file path=ppt/slides/slide11.xml><?xml version="1.0" encoding="utf-8"?>
+<p:sld xmlns:a="http://schemas.openxmlformats.org/drawingml/2006/main" xmlns:r="http://schemas.openxmlformats.org/officeDocument/2006/relationships" xmlns:p="http://schemas.openxmlformats.org/presentationml/2006/main">
+  <p:cSld>
+    <p:spTree>
+      <p:nvGrpSpPr>
+        <p:cNvPr id="1" name=""/>
+        <p:cNvGrpSpPr/>
+        <p:nvPr/>
+      </p:nvGrpSpPr>
+      <p:grpSpPr>
+        <a:xfrm>
+          <a:off x="0" y="0"/>
+          <a:ext cx="0" cy="0"/>
+          <a:chOff x="0" y="0"/>
+          <a:chExt cx="0" cy="0"/>
+        </a:xfrm>
+      </p:grpSpPr>
+      <p:sp>
+        <p:nvSpPr>
+          <p:cNvPr id="2" name="Title 1">
+            <a:extLst>
+              <a:ext uri="{FF2B5EF4-FFF2-40B4-BE49-F238E27FC236}">
+                <a16:creationId xmlns:a16="http://schemas.microsoft.com/office/drawing/2014/main" id="{A50C27E5-8B84-421A-9231-927B52DAA968}"/>
+              </a:ext>
+            </a:extLst>
+          </p:cNvPr>
+          <p:cNvSpPr>
+            <a:spLocks noGrp="1"/>
+          </p:cNvSpPr>
+          <p:nvPr>
+            <p:ph type="title"/>
+          </p:nvPr>
+        </p:nvSpPr>
+        <p:spPr/>
+        <p:txBody>
+          <a:bodyPr/>
+          <a:lstStyle/>
+          <a:p>
+            <a:endParaRPr lang="en-US"/>
+          </a:p>
+        </p:txBody>
+      </p:sp>
+      <p:pic>
+        <p:nvPicPr>
+          <p:cNvPr id="4" name="Picture 3">
+            <a:extLst>
+              <a:ext uri="{FF2B5EF4-FFF2-40B4-BE49-F238E27FC236}">
+                <a16:creationId xmlns:a16="http://schemas.microsoft.com/office/drawing/2014/main" id="{16DBAF4D-603E-4462-B4AF-4501972BDF49}"/>
+              </a:ext>
+            </a:extLst>
+          </p:cNvPr>
+          <p:cNvPicPr>
+            <a:picLocks noChangeAspect="1"/>
+          </p:cNvPicPr>
+          <p:nvPr/>
+        </p:nvPicPr>
+        <p:blipFill>
+          <a:blip r:embed="rId2"/>
+          <a:stretch>
+            <a:fillRect/>
+          </a:stretch>
+        </p:blipFill>
+        <p:spPr>
+          <a:xfrm>
+            <a:off x="2994391" y="304529"/>
+            <a:ext cx="6203218" cy="6248942"/>
+          </a:xfrm>
+          <a:prstGeom prst="rect">
+            <a:avLst/>
+          </a:prstGeom>
+        </p:spPr>
+      </p:pic>
+    </p:spTree>
+    <p:extLst>
+      <p:ext uri="{BB962C8B-B14F-4D97-AF65-F5344CB8AC3E}">
+        <p14:creationId xmlns:p14="http://schemas.microsoft.com/office/powerpoint/2010/main" val="697938928"/>
+      </p:ext>
+    </p:extLst>
+  </p:cSld>
+  <p:clrMapOvr>
+    <a:masterClrMapping/>
+  </p:clrMapOvr>
+</p:sld>
+</file>
+
+<file path=ppt/slides/slide12.xml><?xml version="1.0" encoding="utf-8"?>
+<p:sld xmlns:a="http://schemas.openxmlformats.org/drawingml/2006/main" xmlns:r="http://schemas.openxmlformats.org/officeDocument/2006/relationships" xmlns:p="http://schemas.openxmlformats.org/presentationml/2006/main">
+  <p:cSld>
+    <p:spTree>
+      <p:nvGrpSpPr>
+        <p:cNvPr id="1" name=""/>
+        <p:cNvGrpSpPr/>
+        <p:nvPr/>
+      </p:nvGrpSpPr>
+      <p:grpSpPr>
+        <a:xfrm>
+          <a:off x="0" y="0"/>
+          <a:ext cx="0" cy="0"/>
+          <a:chOff x="0" y="0"/>
+          <a:chExt cx="0" cy="0"/>
+        </a:xfrm>
+      </p:grpSpPr>
+      <p:sp>
+        <p:nvSpPr>
+          <p:cNvPr id="2" name="Title 1">
+            <a:extLst>
+              <a:ext uri="{FF2B5EF4-FFF2-40B4-BE49-F238E27FC236}">
+                <a16:creationId xmlns:a16="http://schemas.microsoft.com/office/drawing/2014/main" id="{2863A740-B63E-49DD-B0A5-E09B339D0EA4}"/>
+              </a:ext>
+            </a:extLst>
+          </p:cNvPr>
+          <p:cNvSpPr>
+            <a:spLocks noGrp="1"/>
+          </p:cNvSpPr>
+          <p:nvPr>
+            <p:ph type="title"/>
+          </p:nvPr>
+        </p:nvSpPr>
+        <p:spPr>
+          <a:xfrm>
+            <a:off x="838200" y="365126"/>
+            <a:ext cx="10515600" cy="678064"/>
+          </a:xfrm>
+        </p:spPr>
+        <p:txBody>
+          <a:bodyPr>
+            <a:normAutofit fontScale="90000"/>
+          </a:bodyPr>
+          <a:lstStyle/>
+          <a:p>
+            <a:r>
+              <a:rPr lang="en-US" dirty="0"/>
+              <a:t>Convert Connection to Project Connection</a:t>
+            </a:r>
+          </a:p>
+        </p:txBody>
+      </p:sp>
+      <p:pic>
+        <p:nvPicPr>
+          <p:cNvPr id="5" name="Picture 4">
+            <a:extLst>
+              <a:ext uri="{FF2B5EF4-FFF2-40B4-BE49-F238E27FC236}">
+                <a16:creationId xmlns:a16="http://schemas.microsoft.com/office/drawing/2014/main" id="{BCD845A1-4BFD-4F7C-BF99-B02405D07415}"/>
+              </a:ext>
+            </a:extLst>
+          </p:cNvPr>
+          <p:cNvPicPr>
+            <a:picLocks noChangeAspect="1"/>
+          </p:cNvPicPr>
+          <p:nvPr/>
+        </p:nvPicPr>
+        <p:blipFill>
+          <a:blip r:embed="rId2"/>
+          <a:stretch>
+            <a:fillRect/>
+          </a:stretch>
+        </p:blipFill>
+        <p:spPr>
+          <a:xfrm>
+            <a:off x="9006636" y="3500836"/>
+            <a:ext cx="2385267" cy="914479"/>
+          </a:xfrm>
+          <a:prstGeom prst="rect">
+            <a:avLst/>
+          </a:prstGeom>
+        </p:spPr>
+      </p:pic>
+      <p:pic>
+        <p:nvPicPr>
+          <p:cNvPr id="7" name="Picture 6">
+            <a:extLst>
+              <a:ext uri="{FF2B5EF4-FFF2-40B4-BE49-F238E27FC236}">
+                <a16:creationId xmlns:a16="http://schemas.microsoft.com/office/drawing/2014/main" id="{9B802F98-7DA0-420B-9E17-56DE73944D86}"/>
+              </a:ext>
+            </a:extLst>
+          </p:cNvPr>
+          <p:cNvPicPr>
+            <a:picLocks noChangeAspect="1"/>
+          </p:cNvPicPr>
+          <p:nvPr/>
+        </p:nvPicPr>
+        <p:blipFill>
+          <a:blip r:embed="rId3"/>
+          <a:stretch>
+            <a:fillRect/>
+          </a:stretch>
+        </p:blipFill>
+        <p:spPr>
+          <a:xfrm>
+            <a:off x="838200" y="2144629"/>
+            <a:ext cx="4259949" cy="4000847"/>
+          </a:xfrm>
+          <a:prstGeom prst="rect">
+            <a:avLst/>
+          </a:prstGeom>
+        </p:spPr>
+      </p:pic>
+      <p:sp>
+        <p:nvSpPr>
+          <p:cNvPr id="11" name="TextBox 10">
+            <a:extLst>
+              <a:ext uri="{FF2B5EF4-FFF2-40B4-BE49-F238E27FC236}">
+                <a16:creationId xmlns:a16="http://schemas.microsoft.com/office/drawing/2014/main" id="{0F0B0A08-CEF7-421C-ACF4-996BA31F99AF}"/>
+              </a:ext>
+            </a:extLst>
+          </p:cNvPr>
+          <p:cNvSpPr txBox="1"/>
+          <p:nvPr/>
+        </p:nvSpPr>
+        <p:spPr>
+          <a:xfrm>
+            <a:off x="5098149" y="3698584"/>
+            <a:ext cx="3798194" cy="369332"/>
+          </a:xfrm>
+          <a:prstGeom prst="rect">
+            <a:avLst/>
+          </a:prstGeom>
+          <a:noFill/>
+        </p:spPr>
+        <p:txBody>
+          <a:bodyPr wrap="square" rtlCol="0">
+            <a:spAutoFit/>
+          </a:bodyPr>
+          <a:lstStyle/>
+          <a:p>
+            <a:r>
+              <a:rPr lang="en-US" dirty="0"/>
+              <a:t>(project) indicates Project connection</a:t>
+            </a:r>
+          </a:p>
+        </p:txBody>
+      </p:sp>
+      <p:sp>
+        <p:nvSpPr>
+          <p:cNvPr id="12" name="TextBox 11">
+            <a:extLst>
+              <a:ext uri="{FF2B5EF4-FFF2-40B4-BE49-F238E27FC236}">
+                <a16:creationId xmlns:a16="http://schemas.microsoft.com/office/drawing/2014/main" id="{16E9A410-6491-42E3-8696-CAE44EF82E12}"/>
+              </a:ext>
+            </a:extLst>
+          </p:cNvPr>
+          <p:cNvSpPr txBox="1"/>
+          <p:nvPr/>
+        </p:nvSpPr>
+        <p:spPr>
+          <a:xfrm>
+            <a:off x="838200" y="1661375"/>
+            <a:ext cx="4259949" cy="369332"/>
+          </a:xfrm>
+          <a:prstGeom prst="rect">
+            <a:avLst/>
+          </a:prstGeom>
+          <a:noFill/>
+        </p:spPr>
+        <p:txBody>
+          <a:bodyPr wrap="square" rtlCol="0">
+            <a:spAutoFit/>
+          </a:bodyPr>
+          <a:lstStyle/>
+          <a:p>
+            <a:r>
+              <a:rPr lang="en-US" dirty="0"/>
+              <a:t>Right-click connection …</a:t>
+            </a:r>
+          </a:p>
+        </p:txBody>
+      </p:sp>
+    </p:spTree>
+    <p:extLst>
+      <p:ext uri="{BB962C8B-B14F-4D97-AF65-F5344CB8AC3E}">
+        <p14:creationId xmlns:p14="http://schemas.microsoft.com/office/powerpoint/2010/main" val="1779449352"/>
+      </p:ext>
+    </p:extLst>
+  </p:cSld>
+  <p:clrMapOvr>
+    <a:masterClrMapping/>
+  </p:clrMapOvr>
+</p:sld>
+</file>
+
+<file path=ppt/slides/slide13.xml><?xml version="1.0" encoding="utf-8"?>
+<p:sld xmlns:a="http://schemas.openxmlformats.org/drawingml/2006/main" xmlns:r="http://schemas.openxmlformats.org/officeDocument/2006/relationships" xmlns:p="http://schemas.openxmlformats.org/presentationml/2006/main">
+  <p:cSld>
+    <p:spTree>
+      <p:nvGrpSpPr>
+        <p:cNvPr id="1" name=""/>
+        <p:cNvGrpSpPr/>
+        <p:nvPr/>
+      </p:nvGrpSpPr>
+      <p:grpSpPr>
+        <a:xfrm>
+          <a:off x="0" y="0"/>
+          <a:ext cx="0" cy="0"/>
+          <a:chOff x="0" y="0"/>
+          <a:chExt cx="0" cy="0"/>
+        </a:xfrm>
+      </p:grpSpPr>
+      <p:sp>
+        <p:nvSpPr>
+          <p:cNvPr id="2" name="Title 1">
+            <a:extLst>
+              <a:ext uri="{FF2B5EF4-FFF2-40B4-BE49-F238E27FC236}">
+                <a16:creationId xmlns:a16="http://schemas.microsoft.com/office/drawing/2014/main" id="{CB732DE5-0246-45CF-AC98-5E2D497FF22F}"/>
+              </a:ext>
+            </a:extLst>
+          </p:cNvPr>
+          <p:cNvSpPr>
+            <a:spLocks noGrp="1"/>
+          </p:cNvSpPr>
+          <p:nvPr>
+            <p:ph type="title"/>
+          </p:nvPr>
+        </p:nvSpPr>
+        <p:spPr/>
+        <p:txBody>
+          <a:bodyPr/>
+          <a:lstStyle/>
+          <a:p>
+            <a:r>
+              <a:rPr lang="en-US" dirty="0"/>
+              <a:t>Parameterize Project Connection</a:t>
+            </a:r>
+          </a:p>
+        </p:txBody>
+      </p:sp>
+      <p:pic>
+        <p:nvPicPr>
+          <p:cNvPr id="4" name="Content Placeholder 3">
+            <a:extLst>
+              <a:ext uri="{FF2B5EF4-FFF2-40B4-BE49-F238E27FC236}">
+                <a16:creationId xmlns:a16="http://schemas.microsoft.com/office/drawing/2014/main" id="{9F0D7B9B-45DF-4D09-BD93-6831C6AE6475}"/>
+              </a:ext>
+            </a:extLst>
+          </p:cNvPr>
+          <p:cNvPicPr>
+            <a:picLocks noGrp="1" noChangeAspect="1"/>
+          </p:cNvPicPr>
+          <p:nvPr>
+            <p:ph idx="1"/>
+          </p:nvPr>
+        </p:nvPicPr>
+        <p:blipFill>
+          <a:blip r:embed="rId2"/>
+          <a:stretch>
+            <a:fillRect/>
+          </a:stretch>
+        </p:blipFill>
+        <p:spPr>
+          <a:xfrm>
+            <a:off x="923925" y="2177700"/>
+            <a:ext cx="4480948" cy="4038950"/>
+          </a:xfrm>
+          <a:prstGeom prst="rect">
+            <a:avLst/>
+          </a:prstGeom>
+        </p:spPr>
+      </p:pic>
+      <p:sp>
+        <p:nvSpPr>
+          <p:cNvPr id="5" name="TextBox 4">
+            <a:extLst>
+              <a:ext uri="{FF2B5EF4-FFF2-40B4-BE49-F238E27FC236}">
+                <a16:creationId xmlns:a16="http://schemas.microsoft.com/office/drawing/2014/main" id="{3749F4A4-25F9-43AC-B354-79C3B22AAFA1}"/>
+              </a:ext>
+            </a:extLst>
+          </p:cNvPr>
+          <p:cNvSpPr txBox="1"/>
+          <p:nvPr/>
+        </p:nvSpPr>
+        <p:spPr>
+          <a:xfrm>
+            <a:off x="876300" y="1690688"/>
+            <a:ext cx="4259949" cy="369332"/>
+          </a:xfrm>
+          <a:prstGeom prst="rect">
+            <a:avLst/>
+          </a:prstGeom>
+          <a:noFill/>
+        </p:spPr>
+        <p:txBody>
+          <a:bodyPr wrap="square" rtlCol="0">
+            <a:spAutoFit/>
+          </a:bodyPr>
+          <a:lstStyle/>
+          <a:p>
+            <a:r>
+              <a:rPr lang="en-US" dirty="0"/>
+              <a:t>Right-click connection …</a:t>
+            </a:r>
+          </a:p>
+        </p:txBody>
+      </p:sp>
+      <p:pic>
+        <p:nvPicPr>
+          <p:cNvPr id="6" name="Content Placeholder 3">
+            <a:extLst>
+              <a:ext uri="{FF2B5EF4-FFF2-40B4-BE49-F238E27FC236}">
+                <a16:creationId xmlns:a16="http://schemas.microsoft.com/office/drawing/2014/main" id="{D5B8B937-5A96-4A1A-8E48-66CC93AD386A}"/>
+              </a:ext>
+            </a:extLst>
+          </p:cNvPr>
+          <p:cNvPicPr>
+            <a:picLocks noChangeAspect="1"/>
+          </p:cNvPicPr>
+          <p:nvPr/>
+        </p:nvPicPr>
+        <p:blipFill>
+          <a:blip r:embed="rId3"/>
+          <a:stretch>
+            <a:fillRect/>
+          </a:stretch>
+        </p:blipFill>
+        <p:spPr>
+          <a:xfrm>
+            <a:off x="6832482" y="2177700"/>
+            <a:ext cx="2982144" cy="4351338"/>
+          </a:xfrm>
+          <a:prstGeom prst="rect">
+            <a:avLst/>
+          </a:prstGeom>
+        </p:spPr>
+      </p:pic>
+    </p:spTree>
+    <p:extLst>
+      <p:ext uri="{BB962C8B-B14F-4D97-AF65-F5344CB8AC3E}">
+        <p14:creationId xmlns:p14="http://schemas.microsoft.com/office/powerpoint/2010/main" val="1614743653"/>
+      </p:ext>
+    </p:extLst>
+  </p:cSld>
+  <p:clrMapOvr>
+    <a:masterClrMapping/>
+  </p:clrMapOvr>
+</p:sld>
+</file>
+
+<file path=ppt/slides/slide14.xml><?xml version="1.0" encoding="utf-8"?>
+<p:sld xmlns:a="http://schemas.openxmlformats.org/drawingml/2006/main" xmlns:r="http://schemas.openxmlformats.org/officeDocument/2006/relationships" xmlns:p="http://schemas.openxmlformats.org/presentationml/2006/main">
+  <p:cSld>
+    <p:spTree>
+      <p:nvGrpSpPr>
+        <p:cNvPr id="1" name=""/>
+        <p:cNvGrpSpPr/>
+        <p:nvPr/>
+      </p:nvGrpSpPr>
+      <p:grpSpPr>
+        <a:xfrm>
+          <a:off x="0" y="0"/>
+          <a:ext cx="0" cy="0"/>
+          <a:chOff x="0" y="0"/>
+          <a:chExt cx="0" cy="0"/>
+        </a:xfrm>
+      </p:grpSpPr>
+      <p:sp>
+        <p:nvSpPr>
+          <p:cNvPr id="2" name="Title 1">
+            <a:extLst>
+              <a:ext uri="{FF2B5EF4-FFF2-40B4-BE49-F238E27FC236}">
+                <a16:creationId xmlns:a16="http://schemas.microsoft.com/office/drawing/2014/main" id="{C2C461B5-A012-4247-9AC2-037C33416D09}"/>
+              </a:ext>
+            </a:extLst>
+          </p:cNvPr>
+          <p:cNvSpPr>
+            <a:spLocks noGrp="1"/>
+          </p:cNvSpPr>
+          <p:nvPr>
+            <p:ph type="title"/>
+          </p:nvPr>
+        </p:nvSpPr>
+        <p:spPr/>
+        <p:txBody>
+          <a:bodyPr/>
+          <a:lstStyle/>
+          <a:p>
+            <a:r>
+              <a:rPr lang="en-US" dirty="0"/>
+              <a:t>Parameterize Project Connection</a:t>
+            </a:r>
+          </a:p>
+        </p:txBody>
+      </p:sp>
+      <p:pic>
+        <p:nvPicPr>
+          <p:cNvPr id="4" name="Content Placeholder 3">
+            <a:extLst>
+              <a:ext uri="{FF2B5EF4-FFF2-40B4-BE49-F238E27FC236}">
+                <a16:creationId xmlns:a16="http://schemas.microsoft.com/office/drawing/2014/main" id="{C507791D-6156-4C80-8F05-C313F8424F2F}"/>
+              </a:ext>
+            </a:extLst>
+          </p:cNvPr>
+          <p:cNvPicPr>
+            <a:picLocks noGrp="1" noChangeAspect="1"/>
+          </p:cNvPicPr>
+          <p:nvPr>
+            <p:ph idx="1"/>
+          </p:nvPr>
+        </p:nvPicPr>
+        <p:blipFill>
+          <a:blip r:embed="rId2"/>
+          <a:stretch>
+            <a:fillRect/>
+          </a:stretch>
+        </p:blipFill>
+        <p:spPr>
+          <a:xfrm>
+            <a:off x="5858234" y="1690688"/>
+            <a:ext cx="2982144" cy="4351338"/>
+          </a:xfrm>
+          <a:prstGeom prst="rect">
+            <a:avLst/>
+          </a:prstGeom>
+        </p:spPr>
+      </p:pic>
+      <p:sp>
+        <p:nvSpPr>
+          <p:cNvPr id="6" name="TextBox 5">
+            <a:extLst>
+              <a:ext uri="{FF2B5EF4-FFF2-40B4-BE49-F238E27FC236}">
+                <a16:creationId xmlns:a16="http://schemas.microsoft.com/office/drawing/2014/main" id="{045009C9-8B05-4F0D-897E-4CC6EC2A4C2C}"/>
+              </a:ext>
+            </a:extLst>
+          </p:cNvPr>
+          <p:cNvSpPr txBox="1"/>
+          <p:nvPr/>
+        </p:nvSpPr>
+        <p:spPr>
+          <a:xfrm>
+            <a:off x="962384" y="1690688"/>
+            <a:ext cx="4173865" cy="2585323"/>
+          </a:xfrm>
+          <a:prstGeom prst="rect">
+            <a:avLst/>
+          </a:prstGeom>
+          <a:noFill/>
+        </p:spPr>
+        <p:txBody>
+          <a:bodyPr wrap="square" rtlCol="0">
+            <a:spAutoFit/>
+          </a:bodyPr>
+          <a:lstStyle/>
+          <a:p>
+            <a:pPr marL="342900" indent="-342900">
+              <a:buFont typeface="+mj-lt"/>
+              <a:buAutoNum type="arabicPeriod"/>
+            </a:pPr>
+            <a:r>
+              <a:rPr lang="en-US" dirty="0"/>
+              <a:t>Select Property to Parameterize</a:t>
+            </a:r>
+          </a:p>
+          <a:p>
+            <a:pPr marL="342900" indent="-342900">
+              <a:buFont typeface="+mj-lt"/>
+              <a:buAutoNum type="arabicPeriod"/>
+            </a:pPr>
+            <a:r>
+              <a:rPr lang="en-US" dirty="0"/>
+              <a:t>Create a new parameter in the SSIS package</a:t>
+            </a:r>
+          </a:p>
+          <a:p>
+            <a:pPr marL="342900" indent="-342900">
+              <a:buFont typeface="+mj-lt"/>
+              <a:buAutoNum type="arabicPeriod"/>
+            </a:pPr>
+            <a:r>
+              <a:rPr lang="en-US" dirty="0"/>
+              <a:t>Specify initial value of </a:t>
+            </a:r>
+            <a:r>
+              <a:rPr lang="en-US" dirty="0" err="1"/>
+              <a:t>ServerName</a:t>
+            </a:r>
+            <a:r>
+              <a:rPr lang="en-US" dirty="0"/>
+              <a:t>; e.g. used in development</a:t>
+            </a:r>
+          </a:p>
+          <a:p>
+            <a:pPr marL="342900" indent="-342900">
+              <a:buFont typeface="+mj-lt"/>
+              <a:buAutoNum type="arabicPeriod"/>
+            </a:pPr>
+            <a:r>
+              <a:rPr lang="en-US" dirty="0"/>
+              <a:t>Set Scope to Project (automatic)</a:t>
+            </a:r>
+          </a:p>
+          <a:p>
+            <a:pPr marL="342900" indent="-342900">
+              <a:buFont typeface="+mj-lt"/>
+              <a:buAutoNum type="arabicPeriod"/>
+            </a:pPr>
+            <a:r>
+              <a:rPr lang="en-US" dirty="0"/>
+              <a:t>Check Required; forces value to be specified when adding to a SQL Server Agent job step</a:t>
+            </a:r>
+          </a:p>
+        </p:txBody>
+      </p:sp>
+    </p:spTree>
+    <p:extLst>
+      <p:ext uri="{BB962C8B-B14F-4D97-AF65-F5344CB8AC3E}">
+        <p14:creationId xmlns:p14="http://schemas.microsoft.com/office/powerpoint/2010/main" val="2986708444"/>
+      </p:ext>
+    </p:extLst>
+  </p:cSld>
+  <p:clrMapOvr>
+    <a:masterClrMapping/>
+  </p:clrMapOvr>
+</p:sld>
+</file>
+
+<file path=ppt/slides/slide15.xml><?xml version="1.0" encoding="utf-8"?>
+<p:sld xmlns:a="http://schemas.openxmlformats.org/drawingml/2006/main" xmlns:r="http://schemas.openxmlformats.org/officeDocument/2006/relationships" xmlns:p="http://schemas.openxmlformats.org/presentationml/2006/main">
+  <p:cSld>
+    <p:spTree>
+      <p:nvGrpSpPr>
+        <p:cNvPr id="1" name=""/>
+        <p:cNvGrpSpPr/>
+        <p:nvPr/>
+      </p:nvGrpSpPr>
+      <p:grpSpPr>
+        <a:xfrm>
+          <a:off x="0" y="0"/>
+          <a:ext cx="0" cy="0"/>
+          <a:chOff x="0" y="0"/>
+          <a:chExt cx="0" cy="0"/>
+        </a:xfrm>
+      </p:grpSpPr>
+      <p:sp>
+        <p:nvSpPr>
+          <p:cNvPr id="2" name="Title 1">
+            <a:extLst>
+              <a:ext uri="{FF2B5EF4-FFF2-40B4-BE49-F238E27FC236}">
+                <a16:creationId xmlns:a16="http://schemas.microsoft.com/office/drawing/2014/main" id="{6BA82A73-36C0-468B-B1D3-2D5738102043}"/>
+              </a:ext>
+            </a:extLst>
+          </p:cNvPr>
+          <p:cNvSpPr>
+            <a:spLocks noGrp="1"/>
+          </p:cNvSpPr>
+          <p:nvPr>
+            <p:ph type="title"/>
+          </p:nvPr>
+        </p:nvSpPr>
+        <p:spPr/>
+        <p:txBody>
+          <a:bodyPr/>
+          <a:lstStyle/>
+          <a:p>
+            <a:r>
+              <a:rPr lang="en-US" dirty="0"/>
+              <a:t>Parameterize</a:t>
+            </a:r>
+          </a:p>
+        </p:txBody>
+      </p:sp>
+      <p:pic>
+        <p:nvPicPr>
+          <p:cNvPr id="5" name="Picture 4">
+            <a:extLst>
+              <a:ext uri="{FF2B5EF4-FFF2-40B4-BE49-F238E27FC236}">
+                <a16:creationId xmlns:a16="http://schemas.microsoft.com/office/drawing/2014/main" id="{F551EDEF-93E8-458C-89CC-8420500D86AB}"/>
+              </a:ext>
+            </a:extLst>
+          </p:cNvPr>
+          <p:cNvPicPr>
+            <a:picLocks noChangeAspect="1"/>
+          </p:cNvPicPr>
+          <p:nvPr/>
+        </p:nvPicPr>
+        <p:blipFill>
+          <a:blip r:embed="rId2"/>
+          <a:stretch>
+            <a:fillRect/>
+          </a:stretch>
+        </p:blipFill>
+        <p:spPr>
+          <a:xfrm>
+            <a:off x="838200" y="2837470"/>
+            <a:ext cx="2872989" cy="1623201"/>
+          </a:xfrm>
+          <a:prstGeom prst="rect">
+            <a:avLst/>
+          </a:prstGeom>
+        </p:spPr>
+      </p:pic>
+      <p:sp>
+        <p:nvSpPr>
+          <p:cNvPr id="6" name="TextBox 5">
+            <a:extLst>
+              <a:ext uri="{FF2B5EF4-FFF2-40B4-BE49-F238E27FC236}">
+                <a16:creationId xmlns:a16="http://schemas.microsoft.com/office/drawing/2014/main" id="{30023C41-87B1-4551-AB82-4210773B7079}"/>
+              </a:ext>
+            </a:extLst>
+          </p:cNvPr>
+          <p:cNvSpPr txBox="1"/>
+          <p:nvPr/>
+        </p:nvSpPr>
+        <p:spPr>
+          <a:xfrm>
+            <a:off x="740492" y="1713045"/>
+            <a:ext cx="4117258" cy="923330"/>
+          </a:xfrm>
+          <a:prstGeom prst="rect">
+            <a:avLst/>
+          </a:prstGeom>
+          <a:noFill/>
+        </p:spPr>
+        <p:txBody>
+          <a:bodyPr wrap="square" rtlCol="0">
+            <a:spAutoFit/>
+          </a:bodyPr>
+          <a:lstStyle/>
+          <a:p>
+            <a:r>
+              <a:rPr lang="en-US" dirty="0"/>
+              <a:t>Double-click </a:t>
+            </a:r>
+            <a:r>
+              <a:rPr lang="en-US" dirty="0" err="1"/>
+              <a:t>Project.params</a:t>
+            </a:r>
+            <a:r>
+              <a:rPr lang="en-US" dirty="0"/>
+              <a:t> in the Solution Explorer to display the list of Project parameters </a:t>
+            </a:r>
+          </a:p>
+        </p:txBody>
+      </p:sp>
+      <p:pic>
+        <p:nvPicPr>
+          <p:cNvPr id="7" name="Picture 6">
+            <a:extLst>
+              <a:ext uri="{FF2B5EF4-FFF2-40B4-BE49-F238E27FC236}">
+                <a16:creationId xmlns:a16="http://schemas.microsoft.com/office/drawing/2014/main" id="{690DE9D2-A482-4C46-BDEB-E818FED3D817}"/>
+              </a:ext>
+            </a:extLst>
+          </p:cNvPr>
+          <p:cNvPicPr>
+            <a:picLocks noChangeAspect="1"/>
+          </p:cNvPicPr>
+          <p:nvPr/>
+        </p:nvPicPr>
+        <p:blipFill>
+          <a:blip r:embed="rId3"/>
+          <a:stretch>
+            <a:fillRect/>
+          </a:stretch>
+        </p:blipFill>
+        <p:spPr>
+          <a:xfrm>
+            <a:off x="838200" y="5386760"/>
+            <a:ext cx="2827265" cy="640135"/>
+          </a:xfrm>
+          <a:prstGeom prst="rect">
+            <a:avLst/>
+          </a:prstGeom>
+        </p:spPr>
+      </p:pic>
+      <p:pic>
+        <p:nvPicPr>
+          <p:cNvPr id="8" name="Picture 7">
+            <a:extLst>
+              <a:ext uri="{FF2B5EF4-FFF2-40B4-BE49-F238E27FC236}">
+                <a16:creationId xmlns:a16="http://schemas.microsoft.com/office/drawing/2014/main" id="{077D5AFD-B636-422A-8732-E3AB10C425B6}"/>
+              </a:ext>
+            </a:extLst>
+          </p:cNvPr>
+          <p:cNvPicPr>
+            <a:picLocks noChangeAspect="1"/>
+          </p:cNvPicPr>
+          <p:nvPr/>
+        </p:nvPicPr>
+        <p:blipFill>
+          <a:blip r:embed="rId4"/>
+          <a:stretch>
+            <a:fillRect/>
+          </a:stretch>
+        </p:blipFill>
+        <p:spPr>
+          <a:xfrm>
+            <a:off x="4955458" y="4091247"/>
+            <a:ext cx="3871295" cy="1935648"/>
+          </a:xfrm>
+          <a:prstGeom prst="rect">
+            <a:avLst/>
+          </a:prstGeom>
+        </p:spPr>
+      </p:pic>
+      <p:pic>
+        <p:nvPicPr>
+          <p:cNvPr id="12" name="Content Placeholder 11">
+            <a:extLst>
+              <a:ext uri="{FF2B5EF4-FFF2-40B4-BE49-F238E27FC236}">
+                <a16:creationId xmlns:a16="http://schemas.microsoft.com/office/drawing/2014/main" id="{24E71B48-DD43-4CB2-9C84-8A09AB665BDA}"/>
+              </a:ext>
+            </a:extLst>
+          </p:cNvPr>
+          <p:cNvPicPr>
+            <a:picLocks noGrp="1" noChangeAspect="1"/>
+          </p:cNvPicPr>
+          <p:nvPr>
+            <p:ph idx="1"/>
+          </p:nvPr>
+        </p:nvPicPr>
+        <p:blipFill>
+          <a:blip r:embed="rId5"/>
+          <a:stretch>
+            <a:fillRect/>
+          </a:stretch>
+        </p:blipFill>
+        <p:spPr>
+          <a:xfrm>
+            <a:off x="4955458" y="1690688"/>
+            <a:ext cx="6241321" cy="1531753"/>
+          </a:xfrm>
+          <a:prstGeom prst="rect">
+            <a:avLst/>
+          </a:prstGeom>
+        </p:spPr>
+      </p:pic>
+      <p:sp>
+        <p:nvSpPr>
+          <p:cNvPr id="13" name="TextBox 12">
+            <a:extLst>
+              <a:ext uri="{FF2B5EF4-FFF2-40B4-BE49-F238E27FC236}">
+                <a16:creationId xmlns:a16="http://schemas.microsoft.com/office/drawing/2014/main" id="{F5C20E63-016B-4103-9B23-E806A6D7CDBA}"/>
+              </a:ext>
+            </a:extLst>
+          </p:cNvPr>
+          <p:cNvSpPr txBox="1"/>
+          <p:nvPr/>
+        </p:nvSpPr>
+        <p:spPr>
+          <a:xfrm>
+            <a:off x="4857750" y="3414885"/>
+            <a:ext cx="4259949" cy="646331"/>
+          </a:xfrm>
+          <a:prstGeom prst="rect">
+            <a:avLst/>
+          </a:prstGeom>
+          <a:noFill/>
+        </p:spPr>
+        <p:txBody>
+          <a:bodyPr wrap="square" rtlCol="0">
+            <a:spAutoFit/>
+          </a:bodyPr>
+          <a:lstStyle/>
+          <a:p>
+            <a:r>
+              <a:rPr lang="en-US" dirty="0" err="1"/>
+              <a:t>ServerName</a:t>
+            </a:r>
+            <a:r>
+              <a:rPr lang="en-US" dirty="0"/>
+              <a:t> gets its value from an expression which is the Project parameter</a:t>
+            </a:r>
+          </a:p>
+        </p:txBody>
+      </p:sp>
+      <p:sp>
+        <p:nvSpPr>
+          <p:cNvPr id="14" name="TextBox 13">
+            <a:extLst>
+              <a:ext uri="{FF2B5EF4-FFF2-40B4-BE49-F238E27FC236}">
+                <a16:creationId xmlns:a16="http://schemas.microsoft.com/office/drawing/2014/main" id="{2A55D78D-A3D0-4D89-A54D-F037B7475DEC}"/>
+              </a:ext>
+            </a:extLst>
+          </p:cNvPr>
+          <p:cNvSpPr txBox="1"/>
+          <p:nvPr/>
+        </p:nvSpPr>
+        <p:spPr>
+          <a:xfrm>
+            <a:off x="766854" y="4640785"/>
+            <a:ext cx="4259949" cy="646331"/>
+          </a:xfrm>
+          <a:prstGeom prst="rect">
+            <a:avLst/>
+          </a:prstGeom>
+          <a:noFill/>
+        </p:spPr>
+        <p:txBody>
+          <a:bodyPr wrap="square" rtlCol="0">
+            <a:spAutoFit/>
+          </a:bodyPr>
+          <a:lstStyle/>
+          <a:p>
+            <a:r>
+              <a:rPr lang="en-US" dirty="0" err="1"/>
+              <a:t>fX</a:t>
+            </a:r>
+            <a:r>
+              <a:rPr lang="en-US" dirty="0"/>
+              <a:t> icon indicates an expression </a:t>
+            </a:r>
+          </a:p>
+          <a:p>
+            <a:r>
+              <a:rPr lang="en-US" dirty="0"/>
+              <a:t>is used</a:t>
+            </a:r>
+          </a:p>
+        </p:txBody>
+      </p:sp>
+    </p:spTree>
+    <p:extLst>
+      <p:ext uri="{BB962C8B-B14F-4D97-AF65-F5344CB8AC3E}">
+        <p14:creationId xmlns:p14="http://schemas.microsoft.com/office/powerpoint/2010/main" val="4176081048"/>
+      </p:ext>
+    </p:extLst>
+  </p:cSld>
+  <p:clrMapOvr>
+    <a:masterClrMapping/>
+  </p:clrMapOvr>
+</p:sld>
+</file>
+
+<file path=ppt/slides/slide16.xml><?xml version="1.0" encoding="utf-8"?>
+<p:sld xmlns:a="http://schemas.openxmlformats.org/drawingml/2006/main" xmlns:r="http://schemas.openxmlformats.org/officeDocument/2006/relationships" xmlns:p="http://schemas.openxmlformats.org/presentationml/2006/main" show="0">
+  <p:cSld>
+    <p:spTree>
+      <p:nvGrpSpPr>
+        <p:cNvPr id="1" name=""/>
+        <p:cNvGrpSpPr/>
+        <p:nvPr/>
+      </p:nvGrpSpPr>
+      <p:grpSpPr>
+        <a:xfrm>
+          <a:off x="0" y="0"/>
+          <a:ext cx="0" cy="0"/>
+          <a:chOff x="0" y="0"/>
+          <a:chExt cx="0" cy="0"/>
+        </a:xfrm>
+      </p:grpSpPr>
+      <p:sp>
+        <p:nvSpPr>
+          <p:cNvPr id="2" name="Title 1">
+            <a:extLst>
+              <a:ext uri="{FF2B5EF4-FFF2-40B4-BE49-F238E27FC236}">
+                <a16:creationId xmlns:a16="http://schemas.microsoft.com/office/drawing/2014/main" id="{95D060CF-BAA1-4E61-8BA2-6836A92157C8}"/>
+              </a:ext>
+            </a:extLst>
+          </p:cNvPr>
+          <p:cNvSpPr>
+            <a:spLocks noGrp="1"/>
+          </p:cNvSpPr>
+          <p:nvPr>
+            <p:ph type="title"/>
+          </p:nvPr>
+        </p:nvSpPr>
+        <p:spPr/>
+        <p:txBody>
+          <a:bodyPr/>
+          <a:lstStyle/>
+          <a:p>
+            <a:r>
+              <a:rPr lang="en-US" dirty="0"/>
+              <a:t>Deploy to SSIS Catalog  (HIDDEN )</a:t>
+            </a:r>
+          </a:p>
+        </p:txBody>
+      </p:sp>
+      <p:sp>
+        <p:nvSpPr>
+          <p:cNvPr id="3" name="Content Placeholder 2">
+            <a:extLst>
+              <a:ext uri="{FF2B5EF4-FFF2-40B4-BE49-F238E27FC236}">
+                <a16:creationId xmlns:a16="http://schemas.microsoft.com/office/drawing/2014/main" id="{8D031ADB-0955-4F6C-8850-58CF8A9FF75C}"/>
+              </a:ext>
+            </a:extLst>
+          </p:cNvPr>
+          <p:cNvSpPr>
+            <a:spLocks noGrp="1"/>
+          </p:cNvSpPr>
+          <p:nvPr>
+            <p:ph idx="1"/>
+          </p:nvPr>
+        </p:nvSpPr>
+        <p:spPr/>
+        <p:txBody>
+          <a:bodyPr/>
+          <a:lstStyle/>
+          <a:p>
+            <a:r>
+              <a:rPr lang="en-US" dirty="0"/>
+              <a:t>Build project</a:t>
+            </a:r>
+          </a:p>
+          <a:p>
+            <a:r>
+              <a:rPr lang="en-US" dirty="0"/>
+              <a:t>Get .ISPAC file from PROJECT FOLDER\bin\Development</a:t>
+            </a:r>
+          </a:p>
+          <a:p>
+            <a:pPr marL="457200" lvl="1" indent="0">
+              <a:buNone/>
+            </a:pPr>
+            <a:endParaRPr lang="en-US" dirty="0"/>
+          </a:p>
+          <a:p>
+            <a:r>
+              <a:rPr lang="en-US" dirty="0"/>
+              <a:t>TO DO: I can’t connect to SSIS service; how do I deploy from ISPAC?</a:t>
+            </a:r>
+          </a:p>
+          <a:p>
+            <a:endParaRPr lang="en-US" dirty="0"/>
+          </a:p>
+        </p:txBody>
+      </p:sp>
+      <p:pic>
+        <p:nvPicPr>
+          <p:cNvPr id="4" name="Picture 3">
+            <a:extLst>
+              <a:ext uri="{FF2B5EF4-FFF2-40B4-BE49-F238E27FC236}">
+                <a16:creationId xmlns:a16="http://schemas.microsoft.com/office/drawing/2014/main" id="{C8641122-2966-4624-BACA-E5AB49CE114E}"/>
+              </a:ext>
+            </a:extLst>
+          </p:cNvPr>
+          <p:cNvPicPr>
+            <a:picLocks noChangeAspect="1"/>
+          </p:cNvPicPr>
+          <p:nvPr/>
+        </p:nvPicPr>
+        <p:blipFill>
+          <a:blip r:embed="rId2"/>
+          <a:stretch>
+            <a:fillRect/>
+          </a:stretch>
+        </p:blipFill>
+        <p:spPr>
+          <a:xfrm>
+            <a:off x="1072277" y="2786967"/>
+            <a:ext cx="5494496" cy="556308"/>
+          </a:xfrm>
+          <a:prstGeom prst="rect">
+            <a:avLst/>
+          </a:prstGeom>
+        </p:spPr>
+      </p:pic>
+    </p:spTree>
+    <p:extLst>
+      <p:ext uri="{BB962C8B-B14F-4D97-AF65-F5344CB8AC3E}">
+        <p14:creationId xmlns:p14="http://schemas.microsoft.com/office/powerpoint/2010/main" val="624668775"/>
+      </p:ext>
+    </p:extLst>
+  </p:cSld>
+  <p:clrMapOvr>
+    <a:masterClrMapping/>
+  </p:clrMapOvr>
+</p:sld>
+</file>
+
+<file path=ppt/slides/slide17.xml><?xml version="1.0" encoding="utf-8"?>
+<p:sld xmlns:a="http://schemas.openxmlformats.org/drawingml/2006/main" xmlns:r="http://schemas.openxmlformats.org/officeDocument/2006/relationships" xmlns:p="http://schemas.openxmlformats.org/presentationml/2006/main">
+  <p:cSld>
+    <p:spTree>
+      <p:nvGrpSpPr>
+        <p:cNvPr id="1" name=""/>
+        <p:cNvGrpSpPr/>
+        <p:nvPr/>
+      </p:nvGrpSpPr>
+      <p:grpSpPr>
+        <a:xfrm>
+          <a:off x="0" y="0"/>
+          <a:ext cx="0" cy="0"/>
+          <a:chOff x="0" y="0"/>
+          <a:chExt cx="0" cy="0"/>
+        </a:xfrm>
+      </p:grpSpPr>
+      <p:sp>
+        <p:nvSpPr>
+          <p:cNvPr id="2" name="Title 1">
+            <a:extLst>
+              <a:ext uri="{FF2B5EF4-FFF2-40B4-BE49-F238E27FC236}">
+                <a16:creationId xmlns:a16="http://schemas.microsoft.com/office/drawing/2014/main" id="{2D1168DD-4330-498B-80C6-B68E7E39424F}"/>
+              </a:ext>
+            </a:extLst>
+          </p:cNvPr>
+          <p:cNvSpPr>
+            <a:spLocks noGrp="1"/>
+          </p:cNvSpPr>
+          <p:nvPr>
+            <p:ph type="title"/>
+          </p:nvPr>
+        </p:nvSpPr>
+        <p:spPr/>
+        <p:txBody>
+          <a:bodyPr/>
+          <a:lstStyle/>
+          <a:p>
+            <a:r>
+              <a:rPr lang="en-US" dirty="0"/>
+              <a:t>Deploy to SSIS Catalog</a:t>
+            </a:r>
+          </a:p>
+        </p:txBody>
+      </p:sp>
+      <p:sp>
+        <p:nvSpPr>
+          <p:cNvPr id="3" name="Content Placeholder 2">
+            <a:extLst>
+              <a:ext uri="{FF2B5EF4-FFF2-40B4-BE49-F238E27FC236}">
+                <a16:creationId xmlns:a16="http://schemas.microsoft.com/office/drawing/2014/main" id="{F739A774-ACF2-40FC-92E0-4145F96D3951}"/>
+              </a:ext>
+            </a:extLst>
+          </p:cNvPr>
+          <p:cNvSpPr>
+            <a:spLocks noGrp="1"/>
+          </p:cNvSpPr>
+          <p:nvPr>
+            <p:ph idx="1"/>
+          </p:nvPr>
+        </p:nvSpPr>
+        <p:spPr/>
+        <p:txBody>
+          <a:bodyPr/>
+          <a:lstStyle/>
+          <a:p>
+            <a:r>
+              <a:rPr lang="en-US" dirty="0"/>
+              <a:t>Right-click SSIS project in Solution Explorer</a:t>
+            </a:r>
+          </a:p>
+          <a:p>
+            <a:r>
+              <a:rPr lang="en-US" dirty="0"/>
+              <a:t>Select Deploy</a:t>
+            </a:r>
+          </a:p>
+          <a:p>
+            <a:r>
+              <a:rPr lang="en-US" dirty="0"/>
+              <a:t>Walk through the Deployment Wizard</a:t>
+            </a:r>
+          </a:p>
+        </p:txBody>
+      </p:sp>
+    </p:spTree>
+    <p:extLst>
+      <p:ext uri="{BB962C8B-B14F-4D97-AF65-F5344CB8AC3E}">
+        <p14:creationId xmlns:p14="http://schemas.microsoft.com/office/powerpoint/2010/main" val="1383828818"/>
+      </p:ext>
+    </p:extLst>
+  </p:cSld>
+  <p:clrMapOvr>
+    <a:masterClrMapping/>
+  </p:clrMapOvr>
+</p:sld>
+</file>
+
+<file path=ppt/slides/slide18.xml><?xml version="1.0" encoding="utf-8"?>
+<p:sld xmlns:a="http://schemas.openxmlformats.org/drawingml/2006/main" xmlns:r="http://schemas.openxmlformats.org/officeDocument/2006/relationships" xmlns:p="http://schemas.openxmlformats.org/presentationml/2006/main">
+  <p:cSld>
+    <p:spTree>
+      <p:nvGrpSpPr>
+        <p:cNvPr id="1" name=""/>
+        <p:cNvGrpSpPr/>
+        <p:nvPr/>
+      </p:nvGrpSpPr>
+      <p:grpSpPr>
+        <a:xfrm>
+          <a:off x="0" y="0"/>
+          <a:ext cx="0" cy="0"/>
+          <a:chOff x="0" y="0"/>
+          <a:chExt cx="0" cy="0"/>
+        </a:xfrm>
+      </p:grpSpPr>
+      <p:sp>
+        <p:nvSpPr>
+          <p:cNvPr id="2" name="Title 1">
+            <a:extLst>
+              <a:ext uri="{FF2B5EF4-FFF2-40B4-BE49-F238E27FC236}">
+                <a16:creationId xmlns:a16="http://schemas.microsoft.com/office/drawing/2014/main" id="{5A8055AF-8C72-4906-9261-35A8FBA4919C}"/>
+              </a:ext>
+            </a:extLst>
+          </p:cNvPr>
+          <p:cNvSpPr>
+            <a:spLocks noGrp="1"/>
+          </p:cNvSpPr>
+          <p:nvPr>
+            <p:ph type="title"/>
+          </p:nvPr>
+        </p:nvSpPr>
+        <p:spPr/>
+        <p:txBody>
+          <a:bodyPr/>
+          <a:lstStyle/>
+          <a:p>
+            <a:r>
+              <a:rPr lang="en-US" dirty="0"/>
+              <a:t>Deployment Wizard – Introduction</a:t>
+            </a:r>
+          </a:p>
+        </p:txBody>
+      </p:sp>
+      <p:pic>
+        <p:nvPicPr>
+          <p:cNvPr id="7" name="Content Placeholder 6">
+            <a:extLst>
+              <a:ext uri="{FF2B5EF4-FFF2-40B4-BE49-F238E27FC236}">
+                <a16:creationId xmlns:a16="http://schemas.microsoft.com/office/drawing/2014/main" id="{F784999E-9EF1-440B-873C-0FB2A6787C02}"/>
+              </a:ext>
+            </a:extLst>
+          </p:cNvPr>
+          <p:cNvPicPr>
+            <a:picLocks noGrp="1" noChangeAspect="1"/>
+          </p:cNvPicPr>
+          <p:nvPr>
+            <p:ph idx="1"/>
+          </p:nvPr>
+        </p:nvPicPr>
+        <p:blipFill>
+          <a:blip r:embed="rId2"/>
+          <a:stretch>
+            <a:fillRect/>
+          </a:stretch>
+        </p:blipFill>
+        <p:spPr>
+          <a:xfrm>
+            <a:off x="3583181" y="1825625"/>
+            <a:ext cx="5025637" cy="4351338"/>
+          </a:xfrm>
+          <a:prstGeom prst="rect">
+            <a:avLst/>
+          </a:prstGeom>
+        </p:spPr>
+      </p:pic>
+    </p:spTree>
+    <p:extLst>
+      <p:ext uri="{BB962C8B-B14F-4D97-AF65-F5344CB8AC3E}">
+        <p14:creationId xmlns:p14="http://schemas.microsoft.com/office/powerpoint/2010/main" val="1203905328"/>
+      </p:ext>
+    </p:extLst>
+  </p:cSld>
+  <p:clrMapOvr>
+    <a:masterClrMapping/>
+  </p:clrMapOvr>
+</p:sld>
+</file>
+
+<file path=ppt/slides/slide19.xml><?xml version="1.0" encoding="utf-8"?>
 <p:sld xmlns:a="http://schemas.openxmlformats.org/drawingml/2006/main" xmlns:r="http://schemas.openxmlformats.org/officeDocument/2006/relationships" xmlns:p="http://schemas.openxmlformats.org/presentationml/2006/main">
   <p:cSld>
     <p:spTree>
@@ -3554,7 +4915,143 @@
 </p:sld>
 </file>
 
-<file path=ppt/slides/slide11.xml><?xml version="1.0" encoding="utf-8"?>
+<file path=ppt/slides/slide2.xml><?xml version="1.0" encoding="utf-8"?>
+<p:sld xmlns:a="http://schemas.openxmlformats.org/drawingml/2006/main" xmlns:r="http://schemas.openxmlformats.org/officeDocument/2006/relationships" xmlns:p="http://schemas.openxmlformats.org/presentationml/2006/main">
+  <p:cSld>
+    <p:spTree>
+      <p:nvGrpSpPr>
+        <p:cNvPr id="1" name=""/>
+        <p:cNvGrpSpPr/>
+        <p:nvPr/>
+      </p:nvGrpSpPr>
+      <p:grpSpPr>
+        <a:xfrm>
+          <a:off x="0" y="0"/>
+          <a:ext cx="0" cy="0"/>
+          <a:chOff x="0" y="0"/>
+          <a:chExt cx="0" cy="0"/>
+        </a:xfrm>
+      </p:grpSpPr>
+      <p:sp>
+        <p:nvSpPr>
+          <p:cNvPr id="2" name="Title 1">
+            <a:extLst>
+              <a:ext uri="{FF2B5EF4-FFF2-40B4-BE49-F238E27FC236}">
+                <a16:creationId xmlns:a16="http://schemas.microsoft.com/office/drawing/2014/main" id="{F1A1B2A5-2AB0-4C21-9E43-94CB4FF8DF0E}"/>
+              </a:ext>
+            </a:extLst>
+          </p:cNvPr>
+          <p:cNvSpPr>
+            <a:spLocks noGrp="1"/>
+          </p:cNvSpPr>
+          <p:nvPr>
+            <p:ph type="title"/>
+          </p:nvPr>
+        </p:nvSpPr>
+        <p:spPr>
+          <a:xfrm>
+            <a:off x="838200" y="365125"/>
+            <a:ext cx="10714022" cy="1325563"/>
+          </a:xfrm>
+        </p:spPr>
+        <p:txBody>
+          <a:bodyPr/>
+          <a:lstStyle/>
+          <a:p>
+            <a:r>
+              <a:rPr lang="en-US" dirty="0"/>
+              <a:t>SSIS Deployment and SQL Agent Best Practices</a:t>
+            </a:r>
+          </a:p>
+        </p:txBody>
+      </p:sp>
+      <p:sp>
+        <p:nvSpPr>
+          <p:cNvPr id="3" name="Content Placeholder 2">
+            <a:extLst>
+              <a:ext uri="{FF2B5EF4-FFF2-40B4-BE49-F238E27FC236}">
+                <a16:creationId xmlns:a16="http://schemas.microsoft.com/office/drawing/2014/main" id="{CFACC73E-5C82-442B-9EE0-7FC8106AE48F}"/>
+              </a:ext>
+            </a:extLst>
+          </p:cNvPr>
+          <p:cNvSpPr>
+            <a:spLocks noGrp="1"/>
+          </p:cNvSpPr>
+          <p:nvPr>
+            <p:ph idx="1"/>
+          </p:nvPr>
+        </p:nvSpPr>
+        <p:spPr/>
+        <p:txBody>
+          <a:bodyPr/>
+          <a:lstStyle/>
+          <a:p>
+            <a:r>
+              <a:rPr lang="en-US" dirty="0"/>
+              <a:t>SSIS Package Parameters - parameter / value pairs used by a single SSIS package</a:t>
+            </a:r>
+          </a:p>
+          <a:p>
+            <a:r>
+              <a:rPr lang="en-US" dirty="0"/>
+              <a:t>SSIS Project Parameters – parameter / value pairs shared between all SSIS packages in an SSIS project; e.g. </a:t>
+            </a:r>
+            <a:r>
+              <a:rPr lang="en-US" dirty="0" err="1"/>
+              <a:t>ServerName</a:t>
+            </a:r>
+            <a:r>
+              <a:rPr lang="en-US" dirty="0"/>
+              <a:t> in Connection Manager, </a:t>
+            </a:r>
+            <a:r>
+              <a:rPr lang="en-US" dirty="0" err="1"/>
+              <a:t>EmailAddresses</a:t>
+            </a:r>
+            <a:r>
+              <a:rPr lang="en-US" dirty="0"/>
+              <a:t> for errors and notifications</a:t>
+            </a:r>
+          </a:p>
+          <a:p>
+            <a:r>
+              <a:rPr lang="en-US" dirty="0"/>
+              <a:t>SSIS Catalog Deployment (SSISDB database)</a:t>
+            </a:r>
+          </a:p>
+          <a:p>
+            <a:pPr lvl="1"/>
+            <a:r>
+              <a:rPr lang="en-US" dirty="0"/>
+              <a:t>Store SSIS projects / execute SSIS packages from the Catalog</a:t>
+            </a:r>
+          </a:p>
+          <a:p>
+            <a:pPr lvl="1"/>
+            <a:r>
+              <a:rPr lang="en-US" dirty="0"/>
+              <a:t>Create Environments in SSIS Catalog; configure Project to get Project Parameter values from environment</a:t>
+            </a:r>
+          </a:p>
+          <a:p>
+            <a:endParaRPr lang="en-US" dirty="0"/>
+          </a:p>
+        </p:txBody>
+      </p:sp>
+    </p:spTree>
+    <p:extLst>
+      <p:ext uri="{BB962C8B-B14F-4D97-AF65-F5344CB8AC3E}">
+        <p14:creationId xmlns:p14="http://schemas.microsoft.com/office/powerpoint/2010/main" val="4166953470"/>
+      </p:ext>
+    </p:extLst>
+  </p:cSld>
+  <p:clrMapOvr>
+    <a:masterClrMapping/>
+  </p:clrMapOvr>
+</p:sld>
+</file>
+
+<file path=ppt/slides/slide20.xml><?xml version="1.0" encoding="utf-8"?>
 <p:sld xmlns:a="http://schemas.openxmlformats.org/drawingml/2006/main" xmlns:r="http://schemas.openxmlformats.org/officeDocument/2006/relationships" xmlns:p="http://schemas.openxmlformats.org/presentationml/2006/main">
   <p:cSld>
     <p:spTree>
@@ -3644,7 +5141,7 @@
 </p:sld>
 </file>
 
-<file path=ppt/slides/slide12.xml><?xml version="1.0" encoding="utf-8"?>
+<file path=ppt/slides/slide21.xml><?xml version="1.0" encoding="utf-8"?>
 <p:sld xmlns:a="http://schemas.openxmlformats.org/drawingml/2006/main" xmlns:r="http://schemas.openxmlformats.org/officeDocument/2006/relationships" xmlns:p="http://schemas.openxmlformats.org/presentationml/2006/main">
   <p:cSld>
     <p:spTree>
@@ -3769,7 +5266,7 @@
 </p:sld>
 </file>
 
-<file path=ppt/slides/slide13.xml><?xml version="1.0" encoding="utf-8"?>
+<file path=ppt/slides/slide22.xml><?xml version="1.0" encoding="utf-8"?>
 <p:sld xmlns:a="http://schemas.openxmlformats.org/drawingml/2006/main" xmlns:r="http://schemas.openxmlformats.org/officeDocument/2006/relationships" xmlns:p="http://schemas.openxmlformats.org/presentationml/2006/main">
   <p:cSld>
     <p:spTree>
@@ -3923,7 +5420,7 @@
 </p:sld>
 </file>
 
-<file path=ppt/slides/slide14.xml><?xml version="1.0" encoding="utf-8"?>
+<file path=ppt/slides/slide23.xml><?xml version="1.0" encoding="utf-8"?>
 <p:sld xmlns:a="http://schemas.openxmlformats.org/drawingml/2006/main" xmlns:r="http://schemas.openxmlformats.org/officeDocument/2006/relationships" xmlns:p="http://schemas.openxmlformats.org/presentationml/2006/main">
   <p:cSld>
     <p:spTree>
@@ -4013,7 +5510,7 @@
 </p:sld>
 </file>
 
-<file path=ppt/slides/slide15.xml><?xml version="1.0" encoding="utf-8"?>
+<file path=ppt/slides/slide24.xml><?xml version="1.0" encoding="utf-8"?>
 <p:sld xmlns:a="http://schemas.openxmlformats.org/drawingml/2006/main" xmlns:r="http://schemas.openxmlformats.org/officeDocument/2006/relationships" xmlns:p="http://schemas.openxmlformats.org/presentationml/2006/main">
   <p:cSld>
     <p:spTree>
@@ -4146,7 +5643,7 @@
 </p:sld>
 </file>
 
-<file path=ppt/slides/slide16.xml><?xml version="1.0" encoding="utf-8"?>
+<file path=ppt/slides/slide25.xml><?xml version="1.0" encoding="utf-8"?>
 <p:sld xmlns:a="http://schemas.openxmlformats.org/drawingml/2006/main" xmlns:r="http://schemas.openxmlformats.org/officeDocument/2006/relationships" xmlns:p="http://schemas.openxmlformats.org/presentationml/2006/main">
   <p:cSld>
     <p:spTree>
@@ -4234,7 +5731,7 @@
 </p:sld>
 </file>
 
-<file path=ppt/slides/slide17.xml><?xml version="1.0" encoding="utf-8"?>
+<file path=ppt/slides/slide26.xml><?xml version="1.0" encoding="utf-8"?>
 <p:sld xmlns:a="http://schemas.openxmlformats.org/drawingml/2006/main" xmlns:r="http://schemas.openxmlformats.org/officeDocument/2006/relationships" xmlns:p="http://schemas.openxmlformats.org/presentationml/2006/main">
   <p:cSld>
     <p:spTree>
@@ -4324,7 +5821,7 @@
 </p:sld>
 </file>
 
-<file path=ppt/slides/slide18.xml><?xml version="1.0" encoding="utf-8"?>
+<file path=ppt/slides/slide27.xml><?xml version="1.0" encoding="utf-8"?>
 <p:sld xmlns:a="http://schemas.openxmlformats.org/drawingml/2006/main" xmlns:r="http://schemas.openxmlformats.org/officeDocument/2006/relationships" xmlns:p="http://schemas.openxmlformats.org/presentationml/2006/main">
   <p:cSld>
     <p:spTree>
@@ -4449,7 +5946,7 @@
 </p:sld>
 </file>
 
-<file path=ppt/slides/slide19.xml><?xml version="1.0" encoding="utf-8"?>
+<file path=ppt/slides/slide28.xml><?xml version="1.0" encoding="utf-8"?>
 <p:sld xmlns:a="http://schemas.openxmlformats.org/drawingml/2006/main" xmlns:r="http://schemas.openxmlformats.org/officeDocument/2006/relationships" xmlns:p="http://schemas.openxmlformats.org/presentationml/2006/main">
   <p:cSld>
     <p:spTree>
@@ -4539,92 +6036,7 @@
 </p:sld>
 </file>
 
-<file path=ppt/slides/slide2.xml><?xml version="1.0" encoding="utf-8"?>
-<p:sld xmlns:a="http://schemas.openxmlformats.org/drawingml/2006/main" xmlns:r="http://schemas.openxmlformats.org/officeDocument/2006/relationships" xmlns:p="http://schemas.openxmlformats.org/presentationml/2006/main">
-  <p:cSld>
-    <p:spTree>
-      <p:nvGrpSpPr>
-        <p:cNvPr id="1" name=""/>
-        <p:cNvGrpSpPr/>
-        <p:nvPr/>
-      </p:nvGrpSpPr>
-      <p:grpSpPr>
-        <a:xfrm>
-          <a:off x="0" y="0"/>
-          <a:ext cx="0" cy="0"/>
-          <a:chOff x="0" y="0"/>
-          <a:chExt cx="0" cy="0"/>
-        </a:xfrm>
-      </p:grpSpPr>
-      <p:sp>
-        <p:nvSpPr>
-          <p:cNvPr id="2" name="Title 1">
-            <a:extLst>
-              <a:ext uri="{FF2B5EF4-FFF2-40B4-BE49-F238E27FC236}">
-                <a16:creationId xmlns:a16="http://schemas.microsoft.com/office/drawing/2014/main" id="{A50C27E5-8B84-421A-9231-927B52DAA968}"/>
-              </a:ext>
-            </a:extLst>
-          </p:cNvPr>
-          <p:cNvSpPr>
-            <a:spLocks noGrp="1"/>
-          </p:cNvSpPr>
-          <p:nvPr>
-            <p:ph type="title"/>
-          </p:nvPr>
-        </p:nvSpPr>
-        <p:spPr/>
-        <p:txBody>
-          <a:bodyPr/>
-          <a:lstStyle/>
-          <a:p>
-            <a:endParaRPr lang="en-US"/>
-          </a:p>
-        </p:txBody>
-      </p:sp>
-      <p:pic>
-        <p:nvPicPr>
-          <p:cNvPr id="4" name="Picture 3">
-            <a:extLst>
-              <a:ext uri="{FF2B5EF4-FFF2-40B4-BE49-F238E27FC236}">
-                <a16:creationId xmlns:a16="http://schemas.microsoft.com/office/drawing/2014/main" id="{16DBAF4D-603E-4462-B4AF-4501972BDF49}"/>
-              </a:ext>
-            </a:extLst>
-          </p:cNvPr>
-          <p:cNvPicPr>
-            <a:picLocks noChangeAspect="1"/>
-          </p:cNvPicPr>
-          <p:nvPr/>
-        </p:nvPicPr>
-        <p:blipFill>
-          <a:blip r:embed="rId2"/>
-          <a:stretch>
-            <a:fillRect/>
-          </a:stretch>
-        </p:blipFill>
-        <p:spPr>
-          <a:xfrm>
-            <a:off x="2994391" y="304529"/>
-            <a:ext cx="6203218" cy="6248942"/>
-          </a:xfrm>
-          <a:prstGeom prst="rect">
-            <a:avLst/>
-          </a:prstGeom>
-        </p:spPr>
-      </p:pic>
-    </p:spTree>
-    <p:extLst>
-      <p:ext uri="{BB962C8B-B14F-4D97-AF65-F5344CB8AC3E}">
-        <p14:creationId xmlns:p14="http://schemas.microsoft.com/office/powerpoint/2010/main" val="697938928"/>
-      </p:ext>
-    </p:extLst>
-  </p:cSld>
-  <p:clrMapOvr>
-    <a:masterClrMapping/>
-  </p:clrMapOvr>
-</p:sld>
-</file>
-
-<file path=ppt/slides/slide20.xml><?xml version="1.0" encoding="utf-8"?>
+<file path=ppt/slides/slide29.xml><?xml version="1.0" encoding="utf-8"?>
 <p:sld xmlns:a="http://schemas.openxmlformats.org/drawingml/2006/main" xmlns:r="http://schemas.openxmlformats.org/officeDocument/2006/relationships" xmlns:p="http://schemas.openxmlformats.org/presentationml/2006/main">
   <p:cSld>
     <p:spTree>
@@ -4714,7 +6126,136 @@
 </p:sld>
 </file>
 
-<file path=ppt/slides/slide21.xml><?xml version="1.0" encoding="utf-8"?>
+<file path=ppt/slides/slide3.xml><?xml version="1.0" encoding="utf-8"?>
+<p:sld xmlns:a="http://schemas.openxmlformats.org/drawingml/2006/main" xmlns:r="http://schemas.openxmlformats.org/officeDocument/2006/relationships" xmlns:p="http://schemas.openxmlformats.org/presentationml/2006/main">
+  <p:cSld>
+    <p:spTree>
+      <p:nvGrpSpPr>
+        <p:cNvPr id="1" name=""/>
+        <p:cNvGrpSpPr/>
+        <p:nvPr/>
+      </p:nvGrpSpPr>
+      <p:grpSpPr>
+        <a:xfrm>
+          <a:off x="0" y="0"/>
+          <a:ext cx="0" cy="0"/>
+          <a:chOff x="0" y="0"/>
+          <a:chExt cx="0" cy="0"/>
+        </a:xfrm>
+      </p:grpSpPr>
+      <p:sp>
+        <p:nvSpPr>
+          <p:cNvPr id="2" name="Title 1">
+            <a:extLst>
+              <a:ext uri="{FF2B5EF4-FFF2-40B4-BE49-F238E27FC236}">
+                <a16:creationId xmlns:a16="http://schemas.microsoft.com/office/drawing/2014/main" id="{F1A1B2A5-2AB0-4C21-9E43-94CB4FF8DF0E}"/>
+              </a:ext>
+            </a:extLst>
+          </p:cNvPr>
+          <p:cNvSpPr>
+            <a:spLocks noGrp="1"/>
+          </p:cNvSpPr>
+          <p:nvPr>
+            <p:ph type="title"/>
+          </p:nvPr>
+        </p:nvSpPr>
+        <p:spPr>
+          <a:xfrm>
+            <a:off x="838200" y="365125"/>
+            <a:ext cx="10714022" cy="1325563"/>
+          </a:xfrm>
+        </p:spPr>
+        <p:txBody>
+          <a:bodyPr/>
+          <a:lstStyle/>
+          <a:p>
+            <a:r>
+              <a:rPr lang="en-US" dirty="0"/>
+              <a:t>SSIS Deployment and SQL Agent Best Practices</a:t>
+            </a:r>
+          </a:p>
+        </p:txBody>
+      </p:sp>
+      <p:sp>
+        <p:nvSpPr>
+          <p:cNvPr id="3" name="Content Placeholder 2">
+            <a:extLst>
+              <a:ext uri="{FF2B5EF4-FFF2-40B4-BE49-F238E27FC236}">
+                <a16:creationId xmlns:a16="http://schemas.microsoft.com/office/drawing/2014/main" id="{CFACC73E-5C82-442B-9EE0-7FC8106AE48F}"/>
+              </a:ext>
+            </a:extLst>
+          </p:cNvPr>
+          <p:cNvSpPr>
+            <a:spLocks noGrp="1"/>
+          </p:cNvSpPr>
+          <p:nvPr>
+            <p:ph idx="1"/>
+          </p:nvPr>
+        </p:nvSpPr>
+        <p:spPr/>
+        <p:txBody>
+          <a:bodyPr/>
+          <a:lstStyle/>
+          <a:p>
+            <a:r>
+              <a:rPr lang="en-US" dirty="0"/>
+              <a:t>Execute SSIS Package in SQL Agent job step</a:t>
+            </a:r>
+          </a:p>
+          <a:p>
+            <a:pPr lvl="1"/>
+            <a:r>
+              <a:rPr lang="en-US" dirty="0"/>
+              <a:t>Retrieve SSIS package from the SSIS Catalog</a:t>
+            </a:r>
+          </a:p>
+          <a:p>
+            <a:pPr lvl="1"/>
+            <a:r>
+              <a:rPr lang="en-US" dirty="0"/>
+              <a:t>Select Environment for SSIS Project Parameters</a:t>
+            </a:r>
+          </a:p>
+          <a:p>
+            <a:pPr lvl="1"/>
+            <a:r>
+              <a:rPr lang="en-US" dirty="0"/>
+              <a:t>Set Project Parameter values from Environment</a:t>
+            </a:r>
+          </a:p>
+          <a:p>
+            <a:pPr lvl="1"/>
+            <a:r>
+              <a:rPr lang="en-US" dirty="0"/>
+              <a:t>Set SSIS Package Parameter values</a:t>
+            </a:r>
+          </a:p>
+          <a:p>
+            <a:pPr lvl="1"/>
+            <a:endParaRPr lang="en-US" dirty="0"/>
+          </a:p>
+          <a:p>
+            <a:endParaRPr lang="en-US" dirty="0"/>
+          </a:p>
+          <a:p>
+            <a:endParaRPr lang="en-US" dirty="0"/>
+          </a:p>
+        </p:txBody>
+      </p:sp>
+    </p:spTree>
+    <p:extLst>
+      <p:ext uri="{BB962C8B-B14F-4D97-AF65-F5344CB8AC3E}">
+        <p14:creationId xmlns:p14="http://schemas.microsoft.com/office/powerpoint/2010/main" val="1180828296"/>
+      </p:ext>
+    </p:extLst>
+  </p:cSld>
+  <p:clrMapOvr>
+    <a:masterClrMapping/>
+  </p:clrMapOvr>
+</p:sld>
+</file>
+
+<file path=ppt/slides/slide30.xml><?xml version="1.0" encoding="utf-8"?>
 <p:sld xmlns:a="http://schemas.openxmlformats.org/drawingml/2006/main" xmlns:r="http://schemas.openxmlformats.org/officeDocument/2006/relationships" xmlns:p="http://schemas.openxmlformats.org/presentationml/2006/main">
   <p:cSld>
     <p:spTree>
@@ -4804,7 +6345,7 @@
 </p:sld>
 </file>
 
-<file path=ppt/slides/slide22.xml><?xml version="1.0" encoding="utf-8"?>
+<file path=ppt/slides/slide31.xml><?xml version="1.0" encoding="utf-8"?>
 <p:sld xmlns:a="http://schemas.openxmlformats.org/drawingml/2006/main" xmlns:r="http://schemas.openxmlformats.org/officeDocument/2006/relationships" xmlns:p="http://schemas.openxmlformats.org/presentationml/2006/main">
   <p:cSld>
     <p:spTree>
@@ -4899,7 +6440,7 @@
 </p:sld>
 </file>
 
-<file path=ppt/slides/slide23.xml><?xml version="1.0" encoding="utf-8"?>
+<file path=ppt/slides/slide32.xml><?xml version="1.0" encoding="utf-8"?>
 <p:sld xmlns:a="http://schemas.openxmlformats.org/drawingml/2006/main" xmlns:r="http://schemas.openxmlformats.org/officeDocument/2006/relationships" xmlns:p="http://schemas.openxmlformats.org/presentationml/2006/main">
   <p:cSld>
     <p:spTree>
@@ -4989,7 +6530,7 @@
 </p:sld>
 </file>
 
-<file path=ppt/slides/slide24.xml><?xml version="1.0" encoding="utf-8"?>
+<file path=ppt/slides/slide33.xml><?xml version="1.0" encoding="utf-8"?>
 <p:sld xmlns:a="http://schemas.openxmlformats.org/drawingml/2006/main" xmlns:r="http://schemas.openxmlformats.org/officeDocument/2006/relationships" xmlns:p="http://schemas.openxmlformats.org/presentationml/2006/main">
   <p:cSld>
     <p:spTree>
@@ -5138,7 +6679,7 @@
 </p:sld>
 </file>
 
-<file path=ppt/slides/slide25.xml><?xml version="1.0" encoding="utf-8"?>
+<file path=ppt/slides/slide34.xml><?xml version="1.0" encoding="utf-8"?>
 <p:sld xmlns:a="http://schemas.openxmlformats.org/drawingml/2006/main" xmlns:r="http://schemas.openxmlformats.org/officeDocument/2006/relationships" xmlns:p="http://schemas.openxmlformats.org/presentationml/2006/main">
   <p:cSld>
     <p:spTree>
@@ -5228,7 +6769,7 @@
 </p:sld>
 </file>
 
-<file path=ppt/slides/slide26.xml><?xml version="1.0" encoding="utf-8"?>
+<file path=ppt/slides/slide35.xml><?xml version="1.0" encoding="utf-8"?>
 <p:sld xmlns:a="http://schemas.openxmlformats.org/drawingml/2006/main" xmlns:r="http://schemas.openxmlformats.org/officeDocument/2006/relationships" xmlns:p="http://schemas.openxmlformats.org/presentationml/2006/main">
   <p:cSld>
     <p:spTree>
@@ -5377,7 +6918,7 @@
 </p:sld>
 </file>
 
-<file path=ppt/slides/slide27.xml><?xml version="1.0" encoding="utf-8"?>
+<file path=ppt/slides/slide36.xml><?xml version="1.0" encoding="utf-8"?>
 <p:sld xmlns:a="http://schemas.openxmlformats.org/drawingml/2006/main" xmlns:r="http://schemas.openxmlformats.org/officeDocument/2006/relationships" xmlns:p="http://schemas.openxmlformats.org/presentationml/2006/main">
   <p:cSld>
     <p:spTree>
@@ -5512,201 +7053,6 @@
 </p:sld>
 </file>
 
-<file path=ppt/slides/slide3.xml><?xml version="1.0" encoding="utf-8"?>
-<p:sld xmlns:a="http://schemas.openxmlformats.org/drawingml/2006/main" xmlns:r="http://schemas.openxmlformats.org/officeDocument/2006/relationships" xmlns:p="http://schemas.openxmlformats.org/presentationml/2006/main">
-  <p:cSld>
-    <p:spTree>
-      <p:nvGrpSpPr>
-        <p:cNvPr id="1" name=""/>
-        <p:cNvGrpSpPr/>
-        <p:nvPr/>
-      </p:nvGrpSpPr>
-      <p:grpSpPr>
-        <a:xfrm>
-          <a:off x="0" y="0"/>
-          <a:ext cx="0" cy="0"/>
-          <a:chOff x="0" y="0"/>
-          <a:chExt cx="0" cy="0"/>
-        </a:xfrm>
-      </p:grpSpPr>
-      <p:sp>
-        <p:nvSpPr>
-          <p:cNvPr id="2" name="Title 1">
-            <a:extLst>
-              <a:ext uri="{FF2B5EF4-FFF2-40B4-BE49-F238E27FC236}">
-                <a16:creationId xmlns:a16="http://schemas.microsoft.com/office/drawing/2014/main" id="{2863A740-B63E-49DD-B0A5-E09B339D0EA4}"/>
-              </a:ext>
-            </a:extLst>
-          </p:cNvPr>
-          <p:cNvSpPr>
-            <a:spLocks noGrp="1"/>
-          </p:cNvSpPr>
-          <p:nvPr>
-            <p:ph type="title"/>
-          </p:nvPr>
-        </p:nvSpPr>
-        <p:spPr>
-          <a:xfrm>
-            <a:off x="838200" y="365126"/>
-            <a:ext cx="10515600" cy="678064"/>
-          </a:xfrm>
-        </p:spPr>
-        <p:txBody>
-          <a:bodyPr>
-            <a:normAutofit fontScale="90000"/>
-          </a:bodyPr>
-          <a:lstStyle/>
-          <a:p>
-            <a:r>
-              <a:rPr lang="en-US" dirty="0"/>
-              <a:t>Convert Connection to Project Connection</a:t>
-            </a:r>
-          </a:p>
-        </p:txBody>
-      </p:sp>
-      <p:pic>
-        <p:nvPicPr>
-          <p:cNvPr id="5" name="Picture 4">
-            <a:extLst>
-              <a:ext uri="{FF2B5EF4-FFF2-40B4-BE49-F238E27FC236}">
-                <a16:creationId xmlns:a16="http://schemas.microsoft.com/office/drawing/2014/main" id="{BCD845A1-4BFD-4F7C-BF99-B02405D07415}"/>
-              </a:ext>
-            </a:extLst>
-          </p:cNvPr>
-          <p:cNvPicPr>
-            <a:picLocks noChangeAspect="1"/>
-          </p:cNvPicPr>
-          <p:nvPr/>
-        </p:nvPicPr>
-        <p:blipFill>
-          <a:blip r:embed="rId2"/>
-          <a:stretch>
-            <a:fillRect/>
-          </a:stretch>
-        </p:blipFill>
-        <p:spPr>
-          <a:xfrm>
-            <a:off x="9006636" y="3500836"/>
-            <a:ext cx="2385267" cy="914479"/>
-          </a:xfrm>
-          <a:prstGeom prst="rect">
-            <a:avLst/>
-          </a:prstGeom>
-        </p:spPr>
-      </p:pic>
-      <p:pic>
-        <p:nvPicPr>
-          <p:cNvPr id="7" name="Picture 6">
-            <a:extLst>
-              <a:ext uri="{FF2B5EF4-FFF2-40B4-BE49-F238E27FC236}">
-                <a16:creationId xmlns:a16="http://schemas.microsoft.com/office/drawing/2014/main" id="{9B802F98-7DA0-420B-9E17-56DE73944D86}"/>
-              </a:ext>
-            </a:extLst>
-          </p:cNvPr>
-          <p:cNvPicPr>
-            <a:picLocks noChangeAspect="1"/>
-          </p:cNvPicPr>
-          <p:nvPr/>
-        </p:nvPicPr>
-        <p:blipFill>
-          <a:blip r:embed="rId3"/>
-          <a:stretch>
-            <a:fillRect/>
-          </a:stretch>
-        </p:blipFill>
-        <p:spPr>
-          <a:xfrm>
-            <a:off x="838200" y="2144629"/>
-            <a:ext cx="4259949" cy="4000847"/>
-          </a:xfrm>
-          <a:prstGeom prst="rect">
-            <a:avLst/>
-          </a:prstGeom>
-        </p:spPr>
-      </p:pic>
-      <p:sp>
-        <p:nvSpPr>
-          <p:cNvPr id="11" name="TextBox 10">
-            <a:extLst>
-              <a:ext uri="{FF2B5EF4-FFF2-40B4-BE49-F238E27FC236}">
-                <a16:creationId xmlns:a16="http://schemas.microsoft.com/office/drawing/2014/main" id="{0F0B0A08-CEF7-421C-ACF4-996BA31F99AF}"/>
-              </a:ext>
-            </a:extLst>
-          </p:cNvPr>
-          <p:cNvSpPr txBox="1"/>
-          <p:nvPr/>
-        </p:nvSpPr>
-        <p:spPr>
-          <a:xfrm>
-            <a:off x="5098149" y="3698584"/>
-            <a:ext cx="3798194" cy="369332"/>
-          </a:xfrm>
-          <a:prstGeom prst="rect">
-            <a:avLst/>
-          </a:prstGeom>
-          <a:noFill/>
-        </p:spPr>
-        <p:txBody>
-          <a:bodyPr wrap="square" rtlCol="0">
-            <a:spAutoFit/>
-          </a:bodyPr>
-          <a:lstStyle/>
-          <a:p>
-            <a:r>
-              <a:rPr lang="en-US" dirty="0"/>
-              <a:t>(project) indicates Project connection</a:t>
-            </a:r>
-          </a:p>
-        </p:txBody>
-      </p:sp>
-      <p:sp>
-        <p:nvSpPr>
-          <p:cNvPr id="12" name="TextBox 11">
-            <a:extLst>
-              <a:ext uri="{FF2B5EF4-FFF2-40B4-BE49-F238E27FC236}">
-                <a16:creationId xmlns:a16="http://schemas.microsoft.com/office/drawing/2014/main" id="{16E9A410-6491-42E3-8696-CAE44EF82E12}"/>
-              </a:ext>
-            </a:extLst>
-          </p:cNvPr>
-          <p:cNvSpPr txBox="1"/>
-          <p:nvPr/>
-        </p:nvSpPr>
-        <p:spPr>
-          <a:xfrm>
-            <a:off x="838200" y="1661375"/>
-            <a:ext cx="4259949" cy="369332"/>
-          </a:xfrm>
-          <a:prstGeom prst="rect">
-            <a:avLst/>
-          </a:prstGeom>
-          <a:noFill/>
-        </p:spPr>
-        <p:txBody>
-          <a:bodyPr wrap="square" rtlCol="0">
-            <a:spAutoFit/>
-          </a:bodyPr>
-          <a:lstStyle/>
-          <a:p>
-            <a:r>
-              <a:rPr lang="en-US" dirty="0"/>
-              <a:t>Right-click connection …</a:t>
-            </a:r>
-          </a:p>
-        </p:txBody>
-      </p:sp>
-    </p:spTree>
-    <p:extLst>
-      <p:ext uri="{BB962C8B-B14F-4D97-AF65-F5344CB8AC3E}">
-        <p14:creationId xmlns:p14="http://schemas.microsoft.com/office/powerpoint/2010/main" val="1779449352"/>
-      </p:ext>
-    </p:extLst>
-  </p:cSld>
-  <p:clrMapOvr>
-    <a:masterClrMapping/>
-  </p:clrMapOvr>
-</p:sld>
-</file>
-
 <file path=ppt/slides/slide4.xml><?xml version="1.0" encoding="utf-8"?>
 <p:sld xmlns:a="http://schemas.openxmlformats.org/drawingml/2006/main" xmlns:r="http://schemas.openxmlformats.org/officeDocument/2006/relationships" xmlns:p="http://schemas.openxmlformats.org/presentationml/2006/main">
   <p:cSld>
@@ -5729,7 +7075,7 @@
           <p:cNvPr id="2" name="Title 1">
             <a:extLst>
               <a:ext uri="{FF2B5EF4-FFF2-40B4-BE49-F238E27FC236}">
-                <a16:creationId xmlns:a16="http://schemas.microsoft.com/office/drawing/2014/main" id="{CB732DE5-0246-45CF-AC98-5E2D497FF22F}"/>
+                <a16:creationId xmlns:a16="http://schemas.microsoft.com/office/drawing/2014/main" id="{1107997A-56FB-467E-AC0F-0DACAC817C6F}"/>
               </a:ext>
             </a:extLst>
           </p:cNvPr>
@@ -5747,26 +7093,103 @@
           <a:p>
             <a:r>
               <a:rPr lang="en-US" dirty="0"/>
-              <a:t>Parameterize Project Connection</a:t>
+              <a:t>SSIS Package Parameters</a:t>
+            </a:r>
+          </a:p>
+        </p:txBody>
+      </p:sp>
+      <p:sp>
+        <p:nvSpPr>
+          <p:cNvPr id="3" name="Content Placeholder 2">
+            <a:extLst>
+              <a:ext uri="{FF2B5EF4-FFF2-40B4-BE49-F238E27FC236}">
+                <a16:creationId xmlns:a16="http://schemas.microsoft.com/office/drawing/2014/main" id="{D1670BFF-6E47-4EB1-931E-D5CD30D6334E}"/>
+              </a:ext>
+            </a:extLst>
+          </p:cNvPr>
+          <p:cNvSpPr>
+            <a:spLocks noGrp="1"/>
+          </p:cNvSpPr>
+          <p:nvPr>
+            <p:ph idx="1"/>
+          </p:nvPr>
+        </p:nvSpPr>
+        <p:spPr>
+          <a:xfrm>
+            <a:off x="910627" y="2744124"/>
+            <a:ext cx="9283575" cy="2881502"/>
+          </a:xfrm>
+        </p:spPr>
+        <p:txBody>
+          <a:bodyPr>
+            <a:normAutofit fontScale="77500" lnSpcReduction="20000"/>
+          </a:bodyPr>
+          <a:lstStyle/>
+          <a:p>
+            <a:r>
+              <a:rPr lang="en-US" dirty="0"/>
+              <a:t>Click </a:t>
+            </a:r>
+            <a:r>
+              <a:rPr lang="en-US" dirty="0" err="1"/>
+              <a:t>Paramet</a:t>
+            </a:r>
+            <a:r>
+              <a:rPr lang="en-US" dirty="0"/>
+              <a:t>… tab</a:t>
+            </a:r>
+          </a:p>
+          <a:p>
+            <a:r>
+              <a:rPr lang="en-US" dirty="0"/>
+              <a:t>Click leftmost icon to Add package parameter(s)</a:t>
+            </a:r>
+          </a:p>
+          <a:p>
+            <a:r>
+              <a:rPr lang="en-US" dirty="0"/>
+              <a:t>Select package parameter and click center icon to delete it</a:t>
+            </a:r>
+          </a:p>
+          <a:p>
+            <a:r>
+              <a:rPr lang="en-US" dirty="0"/>
+              <a:t>If Required = True, you must specify a value when you deploy</a:t>
+            </a:r>
+          </a:p>
+          <a:p>
+            <a:r>
+              <a:rPr lang="en-US" dirty="0"/>
+              <a:t>If Required = False the value in the package is used when you deploy; you can override that</a:t>
+            </a:r>
+          </a:p>
+          <a:p>
+            <a:r>
+              <a:rPr lang="en-US" dirty="0"/>
+              <a:t>If Sensitive = True the value will be encrypted</a:t>
+            </a:r>
+          </a:p>
+          <a:p>
+            <a:r>
+              <a:rPr lang="en-US" dirty="0"/>
+              <a:t>Package parameter is a variable that you use in the package</a:t>
             </a:r>
           </a:p>
         </p:txBody>
       </p:sp>
       <p:pic>
         <p:nvPicPr>
-          <p:cNvPr id="4" name="Content Placeholder 3">
-            <a:extLst>
-              <a:ext uri="{FF2B5EF4-FFF2-40B4-BE49-F238E27FC236}">
-                <a16:creationId xmlns:a16="http://schemas.microsoft.com/office/drawing/2014/main" id="{9F0D7B9B-45DF-4D09-BD93-6831C6AE6475}"/>
+          <p:cNvPr id="6" name="Picture 5">
+            <a:extLst>
+              <a:ext uri="{FF2B5EF4-FFF2-40B4-BE49-F238E27FC236}">
+                <a16:creationId xmlns:a16="http://schemas.microsoft.com/office/drawing/2014/main" id="{E9FA2394-149F-4DD6-8173-64C1504896AA}"/>
               </a:ext>
             </a:extLst>
           </p:cNvPr>
           <p:cNvPicPr>
-            <a:picLocks noGrp="1" noChangeAspect="1"/>
+            <a:picLocks noChangeAspect="1"/>
           </p:cNvPicPr>
-          <p:nvPr>
-            <p:ph idx="1"/>
-          </p:nvPr>
+          <p:nvPr/>
         </p:nvPicPr>
         <p:blipFill>
           <a:blip r:embed="rId2"/>
@@ -5776,73 +7199,8 @@
         </p:blipFill>
         <p:spPr>
           <a:xfrm>
-            <a:off x="923925" y="2177700"/>
-            <a:ext cx="4480948" cy="4038950"/>
-          </a:xfrm>
-          <a:prstGeom prst="rect">
-            <a:avLst/>
-          </a:prstGeom>
-        </p:spPr>
-      </p:pic>
-      <p:sp>
-        <p:nvSpPr>
-          <p:cNvPr id="5" name="TextBox 4">
-            <a:extLst>
-              <a:ext uri="{FF2B5EF4-FFF2-40B4-BE49-F238E27FC236}">
-                <a16:creationId xmlns:a16="http://schemas.microsoft.com/office/drawing/2014/main" id="{3749F4A4-25F9-43AC-B354-79C3B22AAFA1}"/>
-              </a:ext>
-            </a:extLst>
-          </p:cNvPr>
-          <p:cNvSpPr txBox="1"/>
-          <p:nvPr/>
-        </p:nvSpPr>
-        <p:spPr>
-          <a:xfrm>
-            <a:off x="876300" y="1690688"/>
-            <a:ext cx="4259949" cy="369332"/>
-          </a:xfrm>
-          <a:prstGeom prst="rect">
-            <a:avLst/>
-          </a:prstGeom>
-          <a:noFill/>
-        </p:spPr>
-        <p:txBody>
-          <a:bodyPr wrap="square" rtlCol="0">
-            <a:spAutoFit/>
-          </a:bodyPr>
-          <a:lstStyle/>
-          <a:p>
-            <a:r>
-              <a:rPr lang="en-US" dirty="0"/>
-              <a:t>Right-click connection …</a:t>
-            </a:r>
-          </a:p>
-        </p:txBody>
-      </p:sp>
-      <p:pic>
-        <p:nvPicPr>
-          <p:cNvPr id="6" name="Content Placeholder 3">
-            <a:extLst>
-              <a:ext uri="{FF2B5EF4-FFF2-40B4-BE49-F238E27FC236}">
-                <a16:creationId xmlns:a16="http://schemas.microsoft.com/office/drawing/2014/main" id="{D5B8B937-5A96-4A1A-8E48-66CC93AD386A}"/>
-              </a:ext>
-            </a:extLst>
-          </p:cNvPr>
-          <p:cNvPicPr>
-            <a:picLocks noChangeAspect="1"/>
-          </p:cNvPicPr>
-          <p:nvPr/>
-        </p:nvPicPr>
-        <p:blipFill>
-          <a:blip r:embed="rId3"/>
-          <a:stretch>
-            <a:fillRect/>
-          </a:stretch>
-        </p:blipFill>
-        <p:spPr>
-          <a:xfrm>
-            <a:off x="6832482" y="2177700"/>
-            <a:ext cx="2982144" cy="4351338"/>
+            <a:off x="910627" y="1418561"/>
+            <a:ext cx="6142252" cy="1074513"/>
           </a:xfrm>
           <a:prstGeom prst="rect">
             <a:avLst/>
@@ -5852,7 +7210,7 @@
     </p:spTree>
     <p:extLst>
       <p:ext uri="{BB962C8B-B14F-4D97-AF65-F5344CB8AC3E}">
-        <p14:creationId xmlns:p14="http://schemas.microsoft.com/office/powerpoint/2010/main" val="1614743653"/>
+        <p14:creationId xmlns:p14="http://schemas.microsoft.com/office/powerpoint/2010/main" val="2779246321"/>
       </p:ext>
     </p:extLst>
   </p:cSld>
@@ -5884,7 +7242,7 @@
           <p:cNvPr id="2" name="Title 1">
             <a:extLst>
               <a:ext uri="{FF2B5EF4-FFF2-40B4-BE49-F238E27FC236}">
-                <a16:creationId xmlns:a16="http://schemas.microsoft.com/office/drawing/2014/main" id="{C2C461B5-A012-4247-9AC2-037C33416D09}"/>
+                <a16:creationId xmlns:a16="http://schemas.microsoft.com/office/drawing/2014/main" id="{8FF93B77-AEF2-4379-8BD0-9FD0F06CCF83}"/>
               </a:ext>
             </a:extLst>
           </p:cNvPr>
@@ -5902,126 +7260,147 @@
           <a:p>
             <a:r>
               <a:rPr lang="en-US" dirty="0"/>
-              <a:t>Parameterize Project Connection</a:t>
-            </a:r>
-          </a:p>
-        </p:txBody>
-      </p:sp>
-      <p:pic>
-        <p:nvPicPr>
-          <p:cNvPr id="4" name="Content Placeholder 3">
-            <a:extLst>
-              <a:ext uri="{FF2B5EF4-FFF2-40B4-BE49-F238E27FC236}">
-                <a16:creationId xmlns:a16="http://schemas.microsoft.com/office/drawing/2014/main" id="{C507791D-6156-4C80-8F05-C313F8424F2F}"/>
-              </a:ext>
-            </a:extLst>
-          </p:cNvPr>
-          <p:cNvPicPr>
-            <a:picLocks noGrp="1" noChangeAspect="1"/>
-          </p:cNvPicPr>
+              <a:t>SSIS Package Parameter Example</a:t>
+            </a:r>
+          </a:p>
+        </p:txBody>
+      </p:sp>
+      <p:sp>
+        <p:nvSpPr>
+          <p:cNvPr id="3" name="Content Placeholder 2">
+            <a:extLst>
+              <a:ext uri="{FF2B5EF4-FFF2-40B4-BE49-F238E27FC236}">
+                <a16:creationId xmlns:a16="http://schemas.microsoft.com/office/drawing/2014/main" id="{7F3DBDE5-392B-42A4-8E28-251810236374}"/>
+              </a:ext>
+            </a:extLst>
+          </p:cNvPr>
+          <p:cNvSpPr>
+            <a:spLocks noGrp="1"/>
+          </p:cNvSpPr>
           <p:nvPr>
             <p:ph idx="1"/>
           </p:nvPr>
-        </p:nvPicPr>
-        <p:blipFill>
-          <a:blip r:embed="rId2"/>
-          <a:stretch>
-            <a:fillRect/>
-          </a:stretch>
-        </p:blipFill>
-        <p:spPr>
-          <a:xfrm>
-            <a:off x="5858234" y="1690688"/>
-            <a:ext cx="2982144" cy="4351338"/>
-          </a:xfrm>
-          <a:prstGeom prst="rect">
-            <a:avLst/>
-          </a:prstGeom>
-        </p:spPr>
-      </p:pic>
-      <p:sp>
-        <p:nvSpPr>
-          <p:cNvPr id="6" name="TextBox 5">
-            <a:extLst>
-              <a:ext uri="{FF2B5EF4-FFF2-40B4-BE49-F238E27FC236}">
-                <a16:creationId xmlns:a16="http://schemas.microsoft.com/office/drawing/2014/main" id="{045009C9-8B05-4F0D-897E-4CC6EC2A4C2C}"/>
-              </a:ext>
-            </a:extLst>
-          </p:cNvPr>
-          <p:cNvSpPr txBox="1"/>
-          <p:nvPr/>
-        </p:nvSpPr>
-        <p:spPr>
-          <a:xfrm>
-            <a:off x="962384" y="1690688"/>
-            <a:ext cx="4173865" cy="2585323"/>
-          </a:xfrm>
-          <a:prstGeom prst="rect">
-            <a:avLst/>
-          </a:prstGeom>
-          <a:noFill/>
-        </p:spPr>
-        <p:txBody>
-          <a:bodyPr wrap="square" rtlCol="0">
-            <a:spAutoFit/>
+        </p:nvSpPr>
+        <p:spPr/>
+        <p:txBody>
+          <a:bodyPr>
+            <a:normAutofit fontScale="77500" lnSpcReduction="20000"/>
           </a:bodyPr>
           <a:lstStyle/>
           <a:p>
-            <a:pPr marL="342900" indent="-342900">
-              <a:buFont typeface="+mj-lt"/>
-              <a:buAutoNum type="arabicPeriod"/>
+            <a:pPr marL="0" indent="0">
+              <a:buNone/>
             </a:pPr>
             <a:r>
               <a:rPr lang="en-US" dirty="0"/>
-              <a:t>Select Property to Parameterize</a:t>
-            </a:r>
-          </a:p>
-          <a:p>
-            <a:pPr marL="342900" indent="-342900">
-              <a:buFont typeface="+mj-lt"/>
-              <a:buAutoNum type="arabicPeriod"/>
+              <a:t>-- Stored procedure to get BEGIN_FUND_DATE</a:t>
+            </a:r>
+          </a:p>
+          <a:p>
+            <a:pPr marL="0" indent="0">
+              <a:buNone/>
             </a:pPr>
             <a:r>
               <a:rPr lang="en-US" dirty="0"/>
-              <a:t>Create a new parameter in the SSIS package</a:t>
-            </a:r>
-          </a:p>
-          <a:p>
-            <a:pPr marL="342900" indent="-342900">
-              <a:buFont typeface="+mj-lt"/>
-              <a:buAutoNum type="arabicPeriod"/>
+              <a:t>CREATE OR ALTER PROCEDURE [</a:t>
+            </a:r>
+            <a:r>
+              <a:rPr lang="en-US" dirty="0" err="1"/>
+              <a:t>dbo</a:t>
+            </a:r>
+            <a:r>
+              <a:rPr lang="en-US" dirty="0"/>
+              <a:t>].[GET_BEGIN_FUND_DATE]</a:t>
+            </a:r>
+          </a:p>
+          <a:p>
+            <a:pPr marL="0" indent="0">
+              <a:buNone/>
             </a:pPr>
             <a:r>
               <a:rPr lang="en-US" dirty="0"/>
-              <a:t>Specify initial value of </a:t>
-            </a:r>
-            <a:r>
-              <a:rPr lang="en-US" dirty="0" err="1"/>
-              <a:t>ServerName</a:t>
-            </a:r>
-            <a:r>
-              <a:rPr lang="en-US" dirty="0"/>
-              <a:t>; e.g. used in development</a:t>
-            </a:r>
-          </a:p>
-          <a:p>
-            <a:pPr marL="342900" indent="-342900">
-              <a:buFont typeface="+mj-lt"/>
-              <a:buAutoNum type="arabicPeriod"/>
+              <a:t>@P_LOOKBACK_DAYSINT</a:t>
+            </a:r>
+          </a:p>
+          <a:p>
+            <a:pPr marL="0" indent="0">
+              <a:buNone/>
             </a:pPr>
             <a:r>
               <a:rPr lang="en-US" dirty="0"/>
-              <a:t>Set Scope to Project (automatic)</a:t>
-            </a:r>
-          </a:p>
-          <a:p>
-            <a:pPr marL="342900" indent="-342900">
-              <a:buFont typeface="+mj-lt"/>
-              <a:buAutoNum type="arabicPeriod"/>
+              <a:t>,@P_BEGIN_FUND_DATE  DATEOUTPUT</a:t>
+            </a:r>
+          </a:p>
+          <a:p>
+            <a:pPr marL="0" indent="0">
+              <a:buNone/>
             </a:pPr>
             <a:r>
               <a:rPr lang="en-US" dirty="0"/>
-              <a:t>Check Required; forces value to be specified when adding to a SQL Server Agent job step</a:t>
+              <a:t>AS</a:t>
+            </a:r>
+          </a:p>
+          <a:p>
+            <a:pPr marL="0" indent="0">
+              <a:buNone/>
+            </a:pPr>
+            <a:r>
+              <a:rPr lang="en-US" dirty="0"/>
+              <a:t>BEGIN</a:t>
+            </a:r>
+          </a:p>
+          <a:p>
+            <a:pPr marL="0" indent="0">
+              <a:buNone/>
+            </a:pPr>
+            <a:r>
+              <a:rPr lang="en-US" dirty="0"/>
+              <a:t>SET @P_BEGIN_FUND_DATE = DATEADD(day</a:t>
+            </a:r>
+          </a:p>
+          <a:p>
+            <a:pPr marL="0" indent="0">
+              <a:buNone/>
+            </a:pPr>
+            <a:r>
+              <a:rPr lang="en-US" dirty="0"/>
+              <a:t> ,@P_LOOKBACK_DAYS * -1</a:t>
+            </a:r>
+          </a:p>
+          <a:p>
+            <a:pPr marL="0" indent="0">
+              <a:buNone/>
+            </a:pPr>
+            <a:r>
+              <a:rPr lang="en-US" dirty="0"/>
+              <a:t> ,GETDATE()</a:t>
+            </a:r>
+          </a:p>
+          <a:p>
+            <a:pPr marL="0" indent="0">
+              <a:buNone/>
+            </a:pPr>
+            <a:r>
+              <a:rPr lang="en-US" dirty="0"/>
+              <a:t> );</a:t>
+            </a:r>
+          </a:p>
+          <a:p>
+            <a:pPr marL="0" indent="0">
+              <a:buNone/>
+            </a:pPr>
+            <a:r>
+              <a:rPr lang="en-US" dirty="0"/>
+              <a:t>END</a:t>
+            </a:r>
+          </a:p>
+          <a:p>
+            <a:pPr marL="0" indent="0">
+              <a:buNone/>
+            </a:pPr>
+            <a:r>
+              <a:rPr lang="en-US" dirty="0"/>
+              <a:t>GO</a:t>
             </a:r>
           </a:p>
         </p:txBody>
@@ -6029,7 +7408,7 @@
     </p:spTree>
     <p:extLst>
       <p:ext uri="{BB962C8B-B14F-4D97-AF65-F5344CB8AC3E}">
-        <p14:creationId xmlns:p14="http://schemas.microsoft.com/office/powerpoint/2010/main" val="2986708444"/>
+        <p14:creationId xmlns:p14="http://schemas.microsoft.com/office/powerpoint/2010/main" val="3669700008"/>
       </p:ext>
     </p:extLst>
   </p:cSld>
@@ -6061,7 +7440,7 @@
           <p:cNvPr id="2" name="Title 1">
             <a:extLst>
               <a:ext uri="{FF2B5EF4-FFF2-40B4-BE49-F238E27FC236}">
-                <a16:creationId xmlns:a16="http://schemas.microsoft.com/office/drawing/2014/main" id="{6BA82A73-36C0-468B-B1D3-2D5738102043}"/>
+                <a16:creationId xmlns:a16="http://schemas.microsoft.com/office/drawing/2014/main" id="{D23C9F39-098E-4585-A3DC-F51846BD095B}"/>
               </a:ext>
             </a:extLst>
           </p:cNvPr>
@@ -6079,8 +7458,114 @@
           <a:p>
             <a:r>
               <a:rPr lang="en-US" dirty="0"/>
-              <a:t>Parameterize</a:t>
-            </a:r>
+              <a:t>SSIS Package Parameter Example</a:t>
+            </a:r>
+          </a:p>
+        </p:txBody>
+      </p:sp>
+      <p:sp>
+        <p:nvSpPr>
+          <p:cNvPr id="3" name="Content Placeholder 2">
+            <a:extLst>
+              <a:ext uri="{FF2B5EF4-FFF2-40B4-BE49-F238E27FC236}">
+                <a16:creationId xmlns:a16="http://schemas.microsoft.com/office/drawing/2014/main" id="{711BE1A0-500E-484F-BEAD-E74B8BCBD2BA}"/>
+              </a:ext>
+            </a:extLst>
+          </p:cNvPr>
+          <p:cNvSpPr>
+            <a:spLocks noGrp="1"/>
+          </p:cNvSpPr>
+          <p:nvPr>
+            <p:ph idx="1"/>
+          </p:nvPr>
+        </p:nvSpPr>
+        <p:spPr>
+          <a:xfrm>
+            <a:off x="838200" y="1825625"/>
+            <a:ext cx="4286061" cy="4351338"/>
+          </a:xfrm>
+        </p:spPr>
+        <p:txBody>
+          <a:bodyPr>
+            <a:normAutofit lnSpcReduction="10000"/>
+          </a:bodyPr>
+          <a:lstStyle/>
+          <a:p>
+            <a:r>
+              <a:rPr lang="en-US" dirty="0"/>
+              <a:t>Execute SQL Task has a  query with a placeholder (?)</a:t>
+            </a:r>
+          </a:p>
+          <a:p>
+            <a:r>
+              <a:rPr lang="en-US" dirty="0"/>
+              <a:t>Specify the Package Parameter for the Variable Name in the Parameter Mapping page of the Execute SQL Task</a:t>
+            </a:r>
+          </a:p>
+          <a:p>
+            <a:r>
+              <a:rPr lang="en-US" dirty="0"/>
+              <a:t>Save result in SSIS variable BEGIN_FUND_DATE type  datetime </a:t>
+            </a:r>
+          </a:p>
+          <a:p>
+            <a:endParaRPr lang="en-US" dirty="0"/>
+          </a:p>
+        </p:txBody>
+      </p:sp>
+      <p:sp>
+        <p:nvSpPr>
+          <p:cNvPr id="4" name="TextBox 3">
+            <a:extLst>
+              <a:ext uri="{FF2B5EF4-FFF2-40B4-BE49-F238E27FC236}">
+                <a16:creationId xmlns:a16="http://schemas.microsoft.com/office/drawing/2014/main" id="{D1005C3E-47FE-40CB-BD88-EC92C2BFEDC4}"/>
+              </a:ext>
+            </a:extLst>
+          </p:cNvPr>
+          <p:cNvSpPr txBox="1"/>
+          <p:nvPr/>
+        </p:nvSpPr>
+        <p:spPr>
+          <a:xfrm>
+            <a:off x="5216914" y="1825625"/>
+            <a:ext cx="4862464" cy="1477328"/>
+          </a:xfrm>
+          <a:prstGeom prst="rect">
+            <a:avLst/>
+          </a:prstGeom>
+          <a:noFill/>
+        </p:spPr>
+        <p:txBody>
+          <a:bodyPr wrap="square" rtlCol="0">
+            <a:spAutoFit/>
+          </a:bodyPr>
+          <a:lstStyle/>
+          <a:p>
+            <a:r>
+              <a:rPr lang="en-US" dirty="0"/>
+              <a:t>SELECT </a:t>
+            </a:r>
+          </a:p>
+          <a:p>
+            <a:r>
+              <a:rPr lang="en-US" dirty="0"/>
+              <a:t>	DATEADD(day</a:t>
+            </a:r>
+          </a:p>
+          <a:p>
+            <a:r>
+              <a:rPr lang="en-US" dirty="0"/>
+              <a:t>,	? * -1</a:t>
+            </a:r>
+          </a:p>
+          <a:p>
+            <a:r>
+              <a:rPr lang="en-US" dirty="0"/>
+              <a:t>,	GETDATE())</a:t>
+            </a:r>
+          </a:p>
+          <a:p>
+            <a:endParaRPr lang="en-US" dirty="0"/>
           </a:p>
         </p:txBody>
       </p:sp>
@@ -6089,7 +7574,7 @@
           <p:cNvPr id="5" name="Picture 4">
             <a:extLst>
               <a:ext uri="{FF2B5EF4-FFF2-40B4-BE49-F238E27FC236}">
-                <a16:creationId xmlns:a16="http://schemas.microsoft.com/office/drawing/2014/main" id="{F551EDEF-93E8-458C-89CC-8420500D86AB}"/>
+                <a16:creationId xmlns:a16="http://schemas.microsoft.com/office/drawing/2014/main" id="{A22FFCB0-3770-48C4-A8DD-D8F0D5C44191}"/>
               </a:ext>
             </a:extLst>
           </p:cNvPr>
@@ -6106,237 +7591,18 @@
         </p:blipFill>
         <p:spPr>
           <a:xfrm>
-            <a:off x="838200" y="2837470"/>
-            <a:ext cx="2872989" cy="1623201"/>
+            <a:off x="5216914" y="3384051"/>
+            <a:ext cx="6828112" cy="1920406"/>
           </a:xfrm>
           <a:prstGeom prst="rect">
             <a:avLst/>
           </a:prstGeom>
         </p:spPr>
       </p:pic>
-      <p:sp>
-        <p:nvSpPr>
-          <p:cNvPr id="6" name="TextBox 5">
-            <a:extLst>
-              <a:ext uri="{FF2B5EF4-FFF2-40B4-BE49-F238E27FC236}">
-                <a16:creationId xmlns:a16="http://schemas.microsoft.com/office/drawing/2014/main" id="{30023C41-87B1-4551-AB82-4210773B7079}"/>
-              </a:ext>
-            </a:extLst>
-          </p:cNvPr>
-          <p:cNvSpPr txBox="1"/>
-          <p:nvPr/>
-        </p:nvSpPr>
-        <p:spPr>
-          <a:xfrm>
-            <a:off x="740492" y="1713045"/>
-            <a:ext cx="4117258" cy="923330"/>
-          </a:xfrm>
-          <a:prstGeom prst="rect">
-            <a:avLst/>
-          </a:prstGeom>
-          <a:noFill/>
-        </p:spPr>
-        <p:txBody>
-          <a:bodyPr wrap="square" rtlCol="0">
-            <a:spAutoFit/>
-          </a:bodyPr>
-          <a:lstStyle/>
-          <a:p>
-            <a:r>
-              <a:rPr lang="en-US" dirty="0"/>
-              <a:t>Double-click </a:t>
-            </a:r>
-            <a:r>
-              <a:rPr lang="en-US" dirty="0" err="1"/>
-              <a:t>Project.params</a:t>
-            </a:r>
-            <a:r>
-              <a:rPr lang="en-US" dirty="0"/>
-              <a:t> in the Solution Explorer to display the list of Project parameters </a:t>
-            </a:r>
-          </a:p>
-        </p:txBody>
-      </p:sp>
-      <p:pic>
-        <p:nvPicPr>
-          <p:cNvPr id="7" name="Picture 6">
-            <a:extLst>
-              <a:ext uri="{FF2B5EF4-FFF2-40B4-BE49-F238E27FC236}">
-                <a16:creationId xmlns:a16="http://schemas.microsoft.com/office/drawing/2014/main" id="{690DE9D2-A482-4C46-BDEB-E818FED3D817}"/>
-              </a:ext>
-            </a:extLst>
-          </p:cNvPr>
-          <p:cNvPicPr>
-            <a:picLocks noChangeAspect="1"/>
-          </p:cNvPicPr>
-          <p:nvPr/>
-        </p:nvPicPr>
-        <p:blipFill>
-          <a:blip r:embed="rId3"/>
-          <a:stretch>
-            <a:fillRect/>
-          </a:stretch>
-        </p:blipFill>
-        <p:spPr>
-          <a:xfrm>
-            <a:off x="838200" y="5386760"/>
-            <a:ext cx="2827265" cy="640135"/>
-          </a:xfrm>
-          <a:prstGeom prst="rect">
-            <a:avLst/>
-          </a:prstGeom>
-        </p:spPr>
-      </p:pic>
-      <p:pic>
-        <p:nvPicPr>
-          <p:cNvPr id="8" name="Picture 7">
-            <a:extLst>
-              <a:ext uri="{FF2B5EF4-FFF2-40B4-BE49-F238E27FC236}">
-                <a16:creationId xmlns:a16="http://schemas.microsoft.com/office/drawing/2014/main" id="{077D5AFD-B636-422A-8732-E3AB10C425B6}"/>
-              </a:ext>
-            </a:extLst>
-          </p:cNvPr>
-          <p:cNvPicPr>
-            <a:picLocks noChangeAspect="1"/>
-          </p:cNvPicPr>
-          <p:nvPr/>
-        </p:nvPicPr>
-        <p:blipFill>
-          <a:blip r:embed="rId4"/>
-          <a:stretch>
-            <a:fillRect/>
-          </a:stretch>
-        </p:blipFill>
-        <p:spPr>
-          <a:xfrm>
-            <a:off x="4955458" y="4091247"/>
-            <a:ext cx="3871295" cy="1935648"/>
-          </a:xfrm>
-          <a:prstGeom prst="rect">
-            <a:avLst/>
-          </a:prstGeom>
-        </p:spPr>
-      </p:pic>
-      <p:pic>
-        <p:nvPicPr>
-          <p:cNvPr id="12" name="Content Placeholder 11">
-            <a:extLst>
-              <a:ext uri="{FF2B5EF4-FFF2-40B4-BE49-F238E27FC236}">
-                <a16:creationId xmlns:a16="http://schemas.microsoft.com/office/drawing/2014/main" id="{24E71B48-DD43-4CB2-9C84-8A09AB665BDA}"/>
-              </a:ext>
-            </a:extLst>
-          </p:cNvPr>
-          <p:cNvPicPr>
-            <a:picLocks noGrp="1" noChangeAspect="1"/>
-          </p:cNvPicPr>
-          <p:nvPr>
-            <p:ph idx="1"/>
-          </p:nvPr>
-        </p:nvPicPr>
-        <p:blipFill>
-          <a:blip r:embed="rId5"/>
-          <a:stretch>
-            <a:fillRect/>
-          </a:stretch>
-        </p:blipFill>
-        <p:spPr>
-          <a:xfrm>
-            <a:off x="4955458" y="1690688"/>
-            <a:ext cx="6241321" cy="1531753"/>
-          </a:xfrm>
-          <a:prstGeom prst="rect">
-            <a:avLst/>
-          </a:prstGeom>
-        </p:spPr>
-      </p:pic>
-      <p:sp>
-        <p:nvSpPr>
-          <p:cNvPr id="13" name="TextBox 12">
-            <a:extLst>
-              <a:ext uri="{FF2B5EF4-FFF2-40B4-BE49-F238E27FC236}">
-                <a16:creationId xmlns:a16="http://schemas.microsoft.com/office/drawing/2014/main" id="{F5C20E63-016B-4103-9B23-E806A6D7CDBA}"/>
-              </a:ext>
-            </a:extLst>
-          </p:cNvPr>
-          <p:cNvSpPr txBox="1"/>
-          <p:nvPr/>
-        </p:nvSpPr>
-        <p:spPr>
-          <a:xfrm>
-            <a:off x="4857750" y="3414885"/>
-            <a:ext cx="4259949" cy="646331"/>
-          </a:xfrm>
-          <a:prstGeom prst="rect">
-            <a:avLst/>
-          </a:prstGeom>
-          <a:noFill/>
-        </p:spPr>
-        <p:txBody>
-          <a:bodyPr wrap="square" rtlCol="0">
-            <a:spAutoFit/>
-          </a:bodyPr>
-          <a:lstStyle/>
-          <a:p>
-            <a:r>
-              <a:rPr lang="en-US" dirty="0" err="1"/>
-              <a:t>ServerName</a:t>
-            </a:r>
-            <a:r>
-              <a:rPr lang="en-US" dirty="0"/>
-              <a:t> gets its value from an expression which is the Project parameter</a:t>
-            </a:r>
-          </a:p>
-        </p:txBody>
-      </p:sp>
-      <p:sp>
-        <p:nvSpPr>
-          <p:cNvPr id="14" name="TextBox 13">
-            <a:extLst>
-              <a:ext uri="{FF2B5EF4-FFF2-40B4-BE49-F238E27FC236}">
-                <a16:creationId xmlns:a16="http://schemas.microsoft.com/office/drawing/2014/main" id="{2A55D78D-A3D0-4D89-A54D-F037B7475DEC}"/>
-              </a:ext>
-            </a:extLst>
-          </p:cNvPr>
-          <p:cNvSpPr txBox="1"/>
-          <p:nvPr/>
-        </p:nvSpPr>
-        <p:spPr>
-          <a:xfrm>
-            <a:off x="766854" y="4640785"/>
-            <a:ext cx="4259949" cy="646331"/>
-          </a:xfrm>
-          <a:prstGeom prst="rect">
-            <a:avLst/>
-          </a:prstGeom>
-          <a:noFill/>
-        </p:spPr>
-        <p:txBody>
-          <a:bodyPr wrap="square" rtlCol="0">
-            <a:spAutoFit/>
-          </a:bodyPr>
-          <a:lstStyle/>
-          <a:p>
-            <a:r>
-              <a:rPr lang="en-US" dirty="0" err="1"/>
-              <a:t>fX</a:t>
-            </a:r>
-            <a:r>
-              <a:rPr lang="en-US" dirty="0"/>
-              <a:t> icon indicates an expression </a:t>
-            </a:r>
-          </a:p>
-          <a:p>
-            <a:r>
-              <a:rPr lang="en-US" dirty="0"/>
-              <a:t>is used</a:t>
-            </a:r>
-          </a:p>
-        </p:txBody>
-      </p:sp>
     </p:spTree>
     <p:extLst>
       <p:ext uri="{BB962C8B-B14F-4D97-AF65-F5344CB8AC3E}">
-        <p14:creationId xmlns:p14="http://schemas.microsoft.com/office/powerpoint/2010/main" val="4176081048"/>
+        <p14:creationId xmlns:p14="http://schemas.microsoft.com/office/powerpoint/2010/main" val="379877774"/>
       </p:ext>
     </p:extLst>
   </p:cSld>
@@ -6347,7 +7613,7 @@
 </file>
 
 <file path=ppt/slides/slide7.xml><?xml version="1.0" encoding="utf-8"?>
-<p:sld xmlns:a="http://schemas.openxmlformats.org/drawingml/2006/main" xmlns:r="http://schemas.openxmlformats.org/officeDocument/2006/relationships" xmlns:p="http://schemas.openxmlformats.org/presentationml/2006/main" show="0">
+<p:sld xmlns:a="http://schemas.openxmlformats.org/drawingml/2006/main" xmlns:r="http://schemas.openxmlformats.org/officeDocument/2006/relationships" xmlns:p="http://schemas.openxmlformats.org/presentationml/2006/main">
   <p:cSld>
     <p:spTree>
       <p:nvGrpSpPr>
@@ -6368,7 +7634,7 @@
           <p:cNvPr id="2" name="Title 1">
             <a:extLst>
               <a:ext uri="{FF2B5EF4-FFF2-40B4-BE49-F238E27FC236}">
-                <a16:creationId xmlns:a16="http://schemas.microsoft.com/office/drawing/2014/main" id="{95D060CF-BAA1-4E61-8BA2-6836A92157C8}"/>
+                <a16:creationId xmlns:a16="http://schemas.microsoft.com/office/drawing/2014/main" id="{3481E36A-FE14-48C7-8BDB-B6B3AFE8AF89}"/>
               </a:ext>
             </a:extLst>
           </p:cNvPr>
@@ -6386,7 +7652,7 @@
           <a:p>
             <a:r>
               <a:rPr lang="en-US" dirty="0"/>
-              <a:t>Deploy to SSIS Catalog  (HIDDEN )</a:t>
+              <a:t>Add SSIS Package to SQL Agent Job Step</a:t>
             </a:r>
           </a:p>
         </p:txBody>
@@ -6396,7 +7662,7 @@
           <p:cNvPr id="3" name="Content Placeholder 2">
             <a:extLst>
               <a:ext uri="{FF2B5EF4-FFF2-40B4-BE49-F238E27FC236}">
-                <a16:creationId xmlns:a16="http://schemas.microsoft.com/office/drawing/2014/main" id="{8D031ADB-0955-4F6C-8850-58CF8A9FF75C}"/>
+                <a16:creationId xmlns:a16="http://schemas.microsoft.com/office/drawing/2014/main" id="{5AB63682-B030-4A56-AD9B-A69385E20981}"/>
               </a:ext>
             </a:extLst>
           </p:cNvPr>
@@ -6407,32 +7673,25 @@
             <p:ph idx="1"/>
           </p:nvPr>
         </p:nvSpPr>
-        <p:spPr/>
-        <p:txBody>
-          <a:bodyPr/>
-          <a:lstStyle/>
-          <a:p>
-            <a:r>
-              <a:rPr lang="en-US" dirty="0"/>
-              <a:t>Build project</a:t>
-            </a:r>
-          </a:p>
-          <a:p>
-            <a:r>
-              <a:rPr lang="en-US" dirty="0"/>
-              <a:t>Get .ISPAC file from PROJECT FOLDER\bin\Development</a:t>
-            </a:r>
-          </a:p>
-          <a:p>
-            <a:pPr marL="457200" lvl="1" indent="0">
-              <a:buNone/>
-            </a:pPr>
-            <a:endParaRPr lang="en-US" dirty="0"/>
-          </a:p>
-          <a:p>
-            <a:r>
-              <a:rPr lang="en-US" dirty="0"/>
-              <a:t>TO DO: I can’t connect to SSIS service; how do I deploy from ISPAC?</a:t>
+        <p:spPr>
+          <a:xfrm>
+            <a:off x="838200" y="1825625"/>
+            <a:ext cx="5490172" cy="4351338"/>
+          </a:xfrm>
+        </p:spPr>
+        <p:txBody>
+          <a:bodyPr/>
+          <a:lstStyle/>
+          <a:p>
+            <a:r>
+              <a:rPr lang="en-US" dirty="0"/>
+              <a:t>Add SSIS package to new step in SQL Agent job</a:t>
+            </a:r>
+          </a:p>
+          <a:p>
+            <a:r>
+              <a:rPr lang="en-US" dirty="0"/>
+              <a:t>Warning message to remind you to set a value for the Required package parameter</a:t>
             </a:r>
           </a:p>
           <a:p>
@@ -6445,7 +7704,7 @@
           <p:cNvPr id="4" name="Picture 3">
             <a:extLst>
               <a:ext uri="{FF2B5EF4-FFF2-40B4-BE49-F238E27FC236}">
-                <a16:creationId xmlns:a16="http://schemas.microsoft.com/office/drawing/2014/main" id="{C8641122-2966-4624-BACA-E5AB49CE114E}"/>
+                <a16:creationId xmlns:a16="http://schemas.microsoft.com/office/drawing/2014/main" id="{A0A8E7A7-0B00-4245-99E8-EA7E75167723}"/>
               </a:ext>
             </a:extLst>
           </p:cNvPr>
@@ -6462,8 +7721,8 @@
         </p:blipFill>
         <p:spPr>
           <a:xfrm>
-            <a:off x="1072277" y="2786967"/>
-            <a:ext cx="5494496" cy="556308"/>
+            <a:off x="6430853" y="1825625"/>
+            <a:ext cx="4922947" cy="1021168"/>
           </a:xfrm>
           <a:prstGeom prst="rect">
             <a:avLst/>
@@ -6473,7 +7732,7 @@
     </p:spTree>
     <p:extLst>
       <p:ext uri="{BB962C8B-B14F-4D97-AF65-F5344CB8AC3E}">
-        <p14:creationId xmlns:p14="http://schemas.microsoft.com/office/powerpoint/2010/main" val="624668775"/>
+        <p14:creationId xmlns:p14="http://schemas.microsoft.com/office/powerpoint/2010/main" val="833236809"/>
       </p:ext>
     </p:extLst>
   </p:cSld>
@@ -6505,7 +7764,7 @@
           <p:cNvPr id="2" name="Title 1">
             <a:extLst>
               <a:ext uri="{FF2B5EF4-FFF2-40B4-BE49-F238E27FC236}">
-                <a16:creationId xmlns:a16="http://schemas.microsoft.com/office/drawing/2014/main" id="{2D1168DD-4330-498B-80C6-B68E7E39424F}"/>
+                <a16:creationId xmlns:a16="http://schemas.microsoft.com/office/drawing/2014/main" id="{92476501-7B61-4153-A0AC-4FE830D65838}"/>
               </a:ext>
             </a:extLst>
           </p:cNvPr>
@@ -6523,55 +7782,47 @@
           <a:p>
             <a:r>
               <a:rPr lang="en-US" dirty="0"/>
-              <a:t>Deploy to SSIS Catalog</a:t>
-            </a:r>
-          </a:p>
-        </p:txBody>
-      </p:sp>
-      <p:sp>
-        <p:nvSpPr>
-          <p:cNvPr id="3" name="Content Placeholder 2">
-            <a:extLst>
-              <a:ext uri="{FF2B5EF4-FFF2-40B4-BE49-F238E27FC236}">
-                <a16:creationId xmlns:a16="http://schemas.microsoft.com/office/drawing/2014/main" id="{F739A774-ACF2-40FC-92E0-4145F96D3951}"/>
-              </a:ext>
-            </a:extLst>
-          </p:cNvPr>
-          <p:cNvSpPr>
-            <a:spLocks noGrp="1"/>
-          </p:cNvSpPr>
+              <a:t>Set Package Parameter Value in Configuration</a:t>
+            </a:r>
+          </a:p>
+        </p:txBody>
+      </p:sp>
+      <p:pic>
+        <p:nvPicPr>
+          <p:cNvPr id="4" name="Content Placeholder 3">
+            <a:extLst>
+              <a:ext uri="{FF2B5EF4-FFF2-40B4-BE49-F238E27FC236}">
+                <a16:creationId xmlns:a16="http://schemas.microsoft.com/office/drawing/2014/main" id="{66654102-5168-4F81-AF53-F853492103E3}"/>
+              </a:ext>
+            </a:extLst>
+          </p:cNvPr>
+          <p:cNvPicPr>
+            <a:picLocks noGrp="1" noChangeAspect="1"/>
+          </p:cNvPicPr>
           <p:nvPr>
             <p:ph idx="1"/>
           </p:nvPr>
-        </p:nvSpPr>
-        <p:spPr/>
-        <p:txBody>
-          <a:bodyPr/>
-          <a:lstStyle/>
-          <a:p>
-            <a:r>
-              <a:rPr lang="en-US" dirty="0"/>
-              <a:t>Right-click SSIS project in Solution Explorer</a:t>
-            </a:r>
-          </a:p>
-          <a:p>
-            <a:r>
-              <a:rPr lang="en-US" dirty="0"/>
-              <a:t>Select Deploy</a:t>
-            </a:r>
-          </a:p>
-          <a:p>
-            <a:r>
-              <a:rPr lang="en-US" dirty="0"/>
-              <a:t>Walk through the Deployment Wizard</a:t>
-            </a:r>
-          </a:p>
-        </p:txBody>
-      </p:sp>
+        </p:nvPicPr>
+        <p:blipFill>
+          <a:blip r:embed="rId2"/>
+          <a:stretch>
+            <a:fillRect/>
+          </a:stretch>
+        </p:blipFill>
+        <p:spPr>
+          <a:xfrm>
+            <a:off x="3694686" y="1825625"/>
+            <a:ext cx="4802628" cy="4351338"/>
+          </a:xfrm>
+          <a:prstGeom prst="rect">
+            <a:avLst/>
+          </a:prstGeom>
+        </p:spPr>
+      </p:pic>
     </p:spTree>
     <p:extLst>
       <p:ext uri="{BB962C8B-B14F-4D97-AF65-F5344CB8AC3E}">
-        <p14:creationId xmlns:p14="http://schemas.microsoft.com/office/powerpoint/2010/main" val="1383828818"/>
+        <p14:creationId xmlns:p14="http://schemas.microsoft.com/office/powerpoint/2010/main" val="254758214"/>
       </p:ext>
     </p:extLst>
   </p:cSld>
@@ -6603,7 +7854,7 @@
           <p:cNvPr id="2" name="Title 1">
             <a:extLst>
               <a:ext uri="{FF2B5EF4-FFF2-40B4-BE49-F238E27FC236}">
-                <a16:creationId xmlns:a16="http://schemas.microsoft.com/office/drawing/2014/main" id="{5A8055AF-8C72-4906-9261-35A8FBA4919C}"/>
+                <a16:creationId xmlns:a16="http://schemas.microsoft.com/office/drawing/2014/main" id="{4B30803C-0478-4EDA-9CC0-BBF1733A2823}"/>
               </a:ext>
             </a:extLst>
           </p:cNvPr>
@@ -6621,17 +7872,17 @@
           <a:p>
             <a:r>
               <a:rPr lang="en-US" dirty="0"/>
-              <a:t>Deployment Wizard – Introduction</a:t>
+              <a:t>Set Package Parameter Value in Configuration</a:t>
             </a:r>
           </a:p>
         </p:txBody>
       </p:sp>
       <p:pic>
         <p:nvPicPr>
-          <p:cNvPr id="7" name="Content Placeholder 6">
-            <a:extLst>
-              <a:ext uri="{FF2B5EF4-FFF2-40B4-BE49-F238E27FC236}">
-                <a16:creationId xmlns:a16="http://schemas.microsoft.com/office/drawing/2014/main" id="{F784999E-9EF1-440B-873C-0FB2A6787C02}"/>
+          <p:cNvPr id="4" name="Content Placeholder 3">
+            <a:extLst>
+              <a:ext uri="{FF2B5EF4-FFF2-40B4-BE49-F238E27FC236}">
+                <a16:creationId xmlns:a16="http://schemas.microsoft.com/office/drawing/2014/main" id="{7B574BC9-5445-47C9-A75B-3FC2B585D30A}"/>
               </a:ext>
             </a:extLst>
           </p:cNvPr>
@@ -6650,8 +7901,8 @@
         </p:blipFill>
         <p:spPr>
           <a:xfrm>
-            <a:off x="3583181" y="1825625"/>
-            <a:ext cx="5025637" cy="4351338"/>
+            <a:off x="3694686" y="1825625"/>
+            <a:ext cx="4802628" cy="4351338"/>
           </a:xfrm>
           <a:prstGeom prst="rect">
             <a:avLst/>
@@ -6661,7 +7912,7 @@
     </p:spTree>
     <p:extLst>
       <p:ext uri="{BB962C8B-B14F-4D97-AF65-F5344CB8AC3E}">
-        <p14:creationId xmlns:p14="http://schemas.microsoft.com/office/powerpoint/2010/main" val="1203905328"/>
+        <p14:creationId xmlns:p14="http://schemas.microsoft.com/office/powerpoint/2010/main" val="2479085556"/>
       </p:ext>
     </p:extLst>
   </p:cSld>

</xml_diff>